<commit_message>
added 2nd workshop docs
</commit_message>
<xml_diff>
--- a/docs/WIP/CASA_Feb28_v3.pptx
+++ b/docs/WIP/CASA_Feb28_v3.pptx
@@ -13,31 +13,32 @@
     <p:sldId id="281" r:id="rId7"/>
     <p:sldId id="282" r:id="rId8"/>
     <p:sldId id="283" r:id="rId9"/>
+    <p:sldId id="284" r:id="rId10"/>
   </p:sldIdLst>
   <p:sldSz cx="9144000" cy="6858000" type="screen4x3"/>
   <p:notesSz cx="6858000" cy="9144000"/>
   <p:embeddedFontLst>
     <p:embeddedFont>
+      <p:font typeface="Technika-Bold" panose="00000600000000000000" charset="-18"/>
+      <p:regular r:id="rId11"/>
+    </p:embeddedFont>
+    <p:embeddedFont>
       <p:font typeface="Technika" panose="020B0604020202020204" charset="-18"/>
-      <p:regular r:id="rId10"/>
-      <p:bold r:id="rId11"/>
-      <p:italic r:id="rId12"/>
-      <p:boldItalic r:id="rId13"/>
+      <p:regular r:id="rId12"/>
+      <p:bold r:id="rId13"/>
+      <p:italic r:id="rId14"/>
+      <p:boldItalic r:id="rId15"/>
     </p:embeddedFont>
     <p:embeddedFont>
       <p:font typeface="Calibri" panose="020F0502020204030204" pitchFamily="34" charset="0"/>
-      <p:regular r:id="rId14"/>
-      <p:bold r:id="rId15"/>
-      <p:italic r:id="rId16"/>
-      <p:boldItalic r:id="rId17"/>
-    </p:embeddedFont>
-    <p:embeddedFont>
-      <p:font typeface="Technika-Bold" panose="00000600000000000000" charset="-18"/>
-      <p:regular r:id="rId18"/>
+      <p:regular r:id="rId16"/>
+      <p:bold r:id="rId17"/>
+      <p:italic r:id="rId18"/>
+      <p:boldItalic r:id="rId19"/>
     </p:embeddedFont>
   </p:embeddedFontLst>
   <p:custDataLst>
-    <p:tags r:id="rId19"/>
+    <p:tags r:id="rId20"/>
   </p:custDataLst>
   <p:defaultTextStyle>
     <a:defPPr>
@@ -136,7 +137,7 @@
   </p:defaultTextStyle>
   <p:extLst>
     <p:ext uri="{EFAFB233-063F-42B5-8137-9DF3F51BA10A}">
-      <p15:sldGuideLst xmlns:p15="http://schemas.microsoft.com/office/powerpoint/2012/main" xmlns="">
+      <p15:sldGuideLst xmlns:p15="http://schemas.microsoft.com/office/powerpoint/2012/main">
         <p15:guide id="1" orient="horz" pos="1207" userDrawn="1">
           <p15:clr>
             <a:srgbClr val="A4A3A4"/>
@@ -425,7 +426,7 @@
           <a:graphicData uri="http://schemas.openxmlformats.org/presentationml/2006/ole">
             <mc:AlternateContent xmlns:mc="http://schemas.openxmlformats.org/markup-compatibility/2006">
               <mc:Choice xmlns:v="urn:schemas-microsoft-com:vml" Requires="v">
-                <p:oleObj spid="_x0000_s25619" name="think-cell Slide" r:id="rId4" imgW="270" imgH="270" progId="TCLayout.ActiveDocument.1">
+                <p:oleObj spid="_x0000_s25622" name="think-cell Slide" r:id="rId4" imgW="270" imgH="270" progId="TCLayout.ActiveDocument.1">
                   <p:embed/>
                 </p:oleObj>
               </mc:Choice>
@@ -1040,7 +1041,7 @@
             </p:custDataLst>
             <p:extLst>
               <p:ext uri="{D42A27DB-BD31-4B8C-83A1-F6EECF244321}">
-                <p14:modId xmlns:p14="http://schemas.microsoft.com/office/powerpoint/2010/main" val="823488854"/>
+                <p14:modId xmlns:p14="http://schemas.microsoft.com/office/powerpoint/2010/main" val="2503622515"/>
               </p:ext>
             </p:extLst>
           </p:nvPr>
@@ -1053,7 +1054,7 @@
           <a:graphicData uri="http://schemas.openxmlformats.org/presentationml/2006/ole">
             <mc:AlternateContent xmlns:mc="http://schemas.openxmlformats.org/markup-compatibility/2006">
               <mc:Choice xmlns:v="urn:schemas-microsoft-com:vml" Requires="v">
-                <p:oleObj spid="_x0000_s1116" name="think-cell Slide" r:id="rId9" imgW="270" imgH="270" progId="TCLayout.ActiveDocument.1">
+                <p:oleObj spid="_x0000_s1119" name="think-cell Slide" r:id="rId9" imgW="270" imgH="270" progId="TCLayout.ActiveDocument.1">
                   <p:embed/>
                 </p:oleObj>
               </mc:Choice>
@@ -1521,7 +1522,7 @@
   </p:txStyles>
   <p:extLst mod="1">
     <p:ext uri="{27BBF7A9-308A-43DC-89C8-2F10F3537804}">
-      <p15:sldGuideLst xmlns:p15="http://schemas.microsoft.com/office/powerpoint/2012/main" xmlns="">
+      <p15:sldGuideLst xmlns:p15="http://schemas.microsoft.com/office/powerpoint/2012/main">
         <p15:guide id="1" orient="horz" pos="232" userDrawn="1">
           <p15:clr>
             <a:srgbClr val="F26B43"/>
@@ -1771,7 +1772,7 @@
           <a:graphicData uri="http://schemas.openxmlformats.org/presentationml/2006/ole">
             <mc:AlternateContent xmlns:mc="http://schemas.openxmlformats.org/markup-compatibility/2006">
               <mc:Choice xmlns:v="urn:schemas-microsoft-com:vml" Requires="v">
-                <p:oleObj spid="_x0000_s6271" name="think-cell Slide" r:id="rId5" imgW="270" imgH="270" progId="TCLayout.ActiveDocument.1">
+                <p:oleObj spid="_x0000_s6274" name="think-cell Slide" r:id="rId5" imgW="270" imgH="270" progId="TCLayout.ActiveDocument.1">
                   <p:embed/>
                 </p:oleObj>
               </mc:Choice>
@@ -2876,7 +2877,7 @@
           <a:graphicData uri="http://schemas.openxmlformats.org/presentationml/2006/ole">
             <mc:AlternateContent xmlns:mc="http://schemas.openxmlformats.org/markup-compatibility/2006">
               <mc:Choice xmlns:v="urn:schemas-microsoft-com:vml" Requires="v">
-                <p:oleObj spid="_x0000_s29708" name="think-cell Slide" r:id="rId5" imgW="270" imgH="270" progId="TCLayout.ActiveDocument.1">
+                <p:oleObj spid="_x0000_s29711" name="think-cell Slide" r:id="rId5" imgW="270" imgH="270" progId="TCLayout.ActiveDocument.1">
                   <p:embed/>
                 </p:oleObj>
               </mc:Choice>
@@ -4223,7 +4224,7 @@
           <a:graphicData uri="http://schemas.openxmlformats.org/presentationml/2006/ole">
             <mc:AlternateContent xmlns:mc="http://schemas.openxmlformats.org/markup-compatibility/2006">
               <mc:Choice xmlns:v="urn:schemas-microsoft-com:vml" Requires="v">
-                <p:oleObj spid="_x0000_s28702" name="think-cell Slide" r:id="rId5" imgW="270" imgH="270" progId="TCLayout.ActiveDocument.1">
+                <p:oleObj spid="_x0000_s28705" name="think-cell Slide" r:id="rId5" imgW="270" imgH="270" progId="TCLayout.ActiveDocument.1">
                   <p:embed/>
                 </p:oleObj>
               </mc:Choice>
@@ -4956,7 +4957,7 @@
           <a:graphicData uri="http://schemas.openxmlformats.org/presentationml/2006/ole">
             <mc:AlternateContent xmlns:mc="http://schemas.openxmlformats.org/markup-compatibility/2006">
               <mc:Choice xmlns:v="urn:schemas-microsoft-com:vml" Requires="v">
-                <p:oleObj spid="_x0000_s30732" name="think-cell Slide" r:id="rId5" imgW="270" imgH="270" progId="TCLayout.ActiveDocument.1">
+                <p:oleObj spid="_x0000_s30735" name="think-cell Slide" r:id="rId5" imgW="270" imgH="270" progId="TCLayout.ActiveDocument.1">
                   <p:embed/>
                 </p:oleObj>
               </mc:Choice>
@@ -5456,7 +5457,7 @@
           <a:graphicData uri="http://schemas.openxmlformats.org/presentationml/2006/ole">
             <mc:AlternateContent xmlns:mc="http://schemas.openxmlformats.org/markup-compatibility/2006">
               <mc:Choice xmlns:v="urn:schemas-microsoft-com:vml" Requires="v">
-                <p:oleObj spid="_x0000_s31755" name="think-cell Slide" r:id="rId109" imgW="270" imgH="270" progId="TCLayout.ActiveDocument.1">
+                <p:oleObj spid="_x0000_s31758" name="think-cell Slide" r:id="rId109" imgW="270" imgH="270" progId="TCLayout.ActiveDocument.1">
                   <p:embed/>
                 </p:oleObj>
               </mc:Choice>
@@ -16732,7 +16733,7 @@
           <a:graphicData uri="http://schemas.openxmlformats.org/presentationml/2006/ole">
             <mc:AlternateContent xmlns:mc="http://schemas.openxmlformats.org/markup-compatibility/2006">
               <mc:Choice xmlns:v="urn:schemas-microsoft-com:vml" Requires="v">
-                <p:oleObj spid="_x0000_s33807" name="think-cell Slide" r:id="rId5" imgW="270" imgH="270" progId="TCLayout.ActiveDocument.1">
+                <p:oleObj spid="_x0000_s33811" name="think-cell Slide" r:id="rId5" imgW="270" imgH="270" progId="TCLayout.ActiveDocument.1">
                   <p:embed/>
                 </p:oleObj>
               </mc:Choice>
@@ -16972,7 +16973,7 @@
         </p:nvSpPr>
         <p:spPr>
           <a:xfrm>
-            <a:off x="7060968" y="4000835"/>
+            <a:off x="7060968" y="4651239"/>
             <a:ext cx="1457699" cy="549042"/>
           </a:xfrm>
           <a:prstGeom prst="rect">
@@ -17037,7 +17038,7 @@
         </p:nvSpPr>
         <p:spPr>
           <a:xfrm>
-            <a:off x="7060968" y="4651239"/>
+            <a:off x="7060968" y="4000835"/>
             <a:ext cx="1457699" cy="549042"/>
           </a:xfrm>
           <a:prstGeom prst="rect">
@@ -18910,6 +18911,59 @@
         </p:nvCxnSpPr>
         <p:spPr>
           <a:xfrm rot="16200000" flipH="1">
+            <a:off x="6484686" y="4349478"/>
+            <a:ext cx="1026286" cy="126277"/>
+          </a:xfrm>
+          <a:prstGeom prst="bentConnector2">
+            <a:avLst/>
+          </a:prstGeom>
+          <a:noFill/>
+          <a:ln w="6350" cap="flat" cmpd="sng" algn="ctr">
+            <a:solidFill>
+              <a:srgbClr val="4D4D4D"/>
+            </a:solidFill>
+            <a:prstDash val="solid"/>
+            <a:miter lim="800000"/>
+          </a:ln>
+          <a:effectLst/>
+          <a:extLst>
+            <a:ext uri="{909E8E84-426E-40DD-AFC4-6F175D3DCCD1}">
+              <a14:hiddenFill xmlns:a14="http://schemas.microsoft.com/office/drawing/2010/main">
+                <a:solidFill>
+                  <a:schemeClr val="accent1"/>
+                </a:solidFill>
+              </a14:hiddenFill>
+            </a:ext>
+          </a:extLst>
+        </p:spPr>
+        <p:style>
+          <a:lnRef idx="2">
+            <a:schemeClr val="accent1">
+              <a:shade val="50000"/>
+            </a:schemeClr>
+          </a:lnRef>
+          <a:fillRef idx="1">
+            <a:schemeClr val="accent1"/>
+          </a:fillRef>
+          <a:effectRef idx="0">
+            <a:schemeClr val="accent1"/>
+          </a:effectRef>
+          <a:fontRef idx="minor">
+            <a:schemeClr val="lt1"/>
+          </a:fontRef>
+        </p:style>
+      </p:cxnSp>
+      <p:cxnSp>
+        <p:nvCxnSpPr>
+          <p:cNvPr id="166" name="Elbow Connector 165"/>
+          <p:cNvCxnSpPr>
+            <a:stCxn id="142" idx="2"/>
+            <a:endCxn id="115" idx="1"/>
+          </p:cNvCxnSpPr>
+          <p:nvPr/>
+        </p:nvCxnSpPr>
+        <p:spPr>
+          <a:xfrm rot="16200000" flipH="1">
             <a:off x="6809888" y="4024276"/>
             <a:ext cx="375882" cy="126277"/>
           </a:xfrm>
@@ -18952,37 +19006,2338 @@
           </a:fontRef>
         </p:style>
       </p:cxnSp>
-      <p:cxnSp>
-        <p:nvCxnSpPr>
-          <p:cNvPr id="166" name="Elbow Connector 165"/>
-          <p:cNvCxnSpPr>
-            <a:stCxn id="142" idx="2"/>
-            <a:endCxn id="115" idx="1"/>
-          </p:cNvCxnSpPr>
+      <p:sp>
+        <p:nvSpPr>
+          <p:cNvPr id="61" name="NumberBall"/>
+          <p:cNvSpPr>
+            <a:spLocks noChangeArrowheads="1"/>
+          </p:cNvSpPr>
           <p:nvPr/>
-        </p:nvCxnSpPr>
+        </p:nvSpPr>
+        <p:spPr bwMode="gray">
+          <a:xfrm>
+            <a:off x="574026" y="3198329"/>
+            <a:ext cx="295275" cy="295275"/>
+          </a:xfrm>
+          <a:prstGeom prst="ellipse">
+            <a:avLst/>
+          </a:prstGeom>
+          <a:solidFill>
+            <a:srgbClr val="4472C4"/>
+          </a:solidFill>
+          <a:ln w="9525">
+            <a:solidFill>
+              <a:schemeClr val="bg1"/>
+            </a:solidFill>
+          </a:ln>
+        </p:spPr>
+        <p:style>
+          <a:lnRef idx="2">
+            <a:schemeClr val="accent1">
+              <a:shade val="50000"/>
+            </a:schemeClr>
+          </a:lnRef>
+          <a:fillRef idx="1">
+            <a:schemeClr val="accent1"/>
+          </a:fillRef>
+          <a:effectRef idx="0">
+            <a:schemeClr val="accent1"/>
+          </a:effectRef>
+          <a:fontRef idx="minor">
+            <a:schemeClr val="lt1"/>
+          </a:fontRef>
+        </p:style>
+        <p:txBody>
+          <a:bodyPr rot="0" spcFirstLastPara="0" vertOverflow="overflow" horzOverflow="overflow" vert="horz" wrap="none" lIns="0" tIns="0" rIns="0" bIns="0" numCol="1" spcCol="0" rtlCol="0" fromWordArt="0" anchor="ctr" anchorCtr="0" forceAA="0" compatLnSpc="1">
+            <a:prstTxWarp prst="textNoShape">
+              <a:avLst/>
+            </a:prstTxWarp>
+            <a:noAutofit/>
+          </a:bodyPr>
+          <a:lstStyle/>
+          <a:p>
+            <a:pPr lvl="0" algn="ctr"/>
+            <a:r>
+              <a:rPr lang="en-US" sz="1600" b="1" dirty="0">
+                <a:solidFill>
+                  <a:srgbClr val="FFFFFF"/>
+                </a:solidFill>
+                <a:latin typeface="Arial" panose="020B0604020202020204" pitchFamily="34" charset="0"/>
+                <a:cs typeface="Arial" pitchFamily="34" charset="0"/>
+              </a:rPr>
+              <a:t>1</a:t>
+            </a:r>
+            <a:endParaRPr lang="en-US" sz="1600" b="1" dirty="0">
+              <a:solidFill>
+                <a:srgbClr val="FFFFFF"/>
+              </a:solidFill>
+              <a:latin typeface="Arial" panose="020B0604020202020204" pitchFamily="34" charset="0"/>
+              <a:cs typeface="Arial" pitchFamily="34" charset="0"/>
+            </a:endParaRPr>
+          </a:p>
+        </p:txBody>
+      </p:sp>
+      <p:sp>
+        <p:nvSpPr>
+          <p:cNvPr id="62" name="NumberBall"/>
+          <p:cNvSpPr>
+            <a:spLocks noChangeArrowheads="1"/>
+          </p:cNvSpPr>
+          <p:nvPr/>
+        </p:nvSpPr>
+        <p:spPr bwMode="gray">
+          <a:xfrm>
+            <a:off x="4535489" y="3198329"/>
+            <a:ext cx="295275" cy="295275"/>
+          </a:xfrm>
+          <a:prstGeom prst="ellipse">
+            <a:avLst/>
+          </a:prstGeom>
+          <a:solidFill>
+            <a:srgbClr val="4472C4"/>
+          </a:solidFill>
+          <a:ln w="9525">
+            <a:solidFill>
+              <a:schemeClr val="bg1"/>
+            </a:solidFill>
+          </a:ln>
+        </p:spPr>
+        <p:style>
+          <a:lnRef idx="2">
+            <a:schemeClr val="accent1">
+              <a:shade val="50000"/>
+            </a:schemeClr>
+          </a:lnRef>
+          <a:fillRef idx="1">
+            <a:schemeClr val="accent1"/>
+          </a:fillRef>
+          <a:effectRef idx="0">
+            <a:schemeClr val="accent1"/>
+          </a:effectRef>
+          <a:fontRef idx="minor">
+            <a:schemeClr val="lt1"/>
+          </a:fontRef>
+        </p:style>
+        <p:txBody>
+          <a:bodyPr rot="0" spcFirstLastPara="0" vertOverflow="overflow" horzOverflow="overflow" vert="horz" wrap="none" lIns="0" tIns="0" rIns="0" bIns="0" numCol="1" spcCol="0" rtlCol="0" fromWordArt="0" anchor="ctr" anchorCtr="0" forceAA="0" compatLnSpc="1">
+            <a:prstTxWarp prst="textNoShape">
+              <a:avLst/>
+            </a:prstTxWarp>
+            <a:noAutofit/>
+          </a:bodyPr>
+          <a:lstStyle/>
+          <a:p>
+            <a:pPr lvl="0" algn="ctr"/>
+            <a:r>
+              <a:rPr lang="en-US" sz="1600" b="1">
+                <a:solidFill>
+                  <a:srgbClr val="FFFFFF"/>
+                </a:solidFill>
+                <a:latin typeface="Arial" panose="020B0604020202020204" pitchFamily="34" charset="0"/>
+                <a:cs typeface="Arial" pitchFamily="34" charset="0"/>
+              </a:rPr>
+              <a:t>2</a:t>
+            </a:r>
+            <a:endParaRPr lang="en-US" sz="1600" b="1" dirty="0">
+              <a:solidFill>
+                <a:srgbClr val="FFFFFF"/>
+              </a:solidFill>
+              <a:latin typeface="Arial" panose="020B0604020202020204" pitchFamily="34" charset="0"/>
+              <a:cs typeface="Arial" pitchFamily="34" charset="0"/>
+            </a:endParaRPr>
+          </a:p>
+        </p:txBody>
+      </p:sp>
+      <p:sp>
+        <p:nvSpPr>
+          <p:cNvPr id="63" name="NumberBall"/>
+          <p:cNvSpPr>
+            <a:spLocks noChangeArrowheads="1"/>
+          </p:cNvSpPr>
+          <p:nvPr/>
+        </p:nvSpPr>
+        <p:spPr bwMode="gray">
+          <a:xfrm>
+            <a:off x="6702554" y="3198329"/>
+            <a:ext cx="295275" cy="295275"/>
+          </a:xfrm>
+          <a:prstGeom prst="ellipse">
+            <a:avLst/>
+          </a:prstGeom>
+          <a:solidFill>
+            <a:srgbClr val="4472C4"/>
+          </a:solidFill>
+          <a:ln w="9525">
+            <a:solidFill>
+              <a:schemeClr val="bg1"/>
+            </a:solidFill>
+          </a:ln>
+        </p:spPr>
+        <p:style>
+          <a:lnRef idx="2">
+            <a:schemeClr val="accent1">
+              <a:shade val="50000"/>
+            </a:schemeClr>
+          </a:lnRef>
+          <a:fillRef idx="1">
+            <a:schemeClr val="accent1"/>
+          </a:fillRef>
+          <a:effectRef idx="0">
+            <a:schemeClr val="accent1"/>
+          </a:effectRef>
+          <a:fontRef idx="minor">
+            <a:schemeClr val="lt1"/>
+          </a:fontRef>
+        </p:style>
+        <p:txBody>
+          <a:bodyPr rot="0" spcFirstLastPara="0" vertOverflow="overflow" horzOverflow="overflow" vert="horz" wrap="none" lIns="0" tIns="0" rIns="0" bIns="0" numCol="1" spcCol="0" rtlCol="0" fromWordArt="0" anchor="ctr" anchorCtr="0" forceAA="0" compatLnSpc="1">
+            <a:prstTxWarp prst="textNoShape">
+              <a:avLst/>
+            </a:prstTxWarp>
+            <a:noAutofit/>
+          </a:bodyPr>
+          <a:lstStyle/>
+          <a:p>
+            <a:pPr lvl="0" algn="ctr"/>
+            <a:r>
+              <a:rPr lang="en-US" sz="1600" b="1">
+                <a:solidFill>
+                  <a:srgbClr val="FFFFFF"/>
+                </a:solidFill>
+                <a:latin typeface="Arial" panose="020B0604020202020204" pitchFamily="34" charset="0"/>
+                <a:cs typeface="Arial" pitchFamily="34" charset="0"/>
+              </a:rPr>
+              <a:t>3</a:t>
+            </a:r>
+            <a:endParaRPr lang="en-US" sz="1600" b="1" dirty="0">
+              <a:solidFill>
+                <a:srgbClr val="FFFFFF"/>
+              </a:solidFill>
+              <a:latin typeface="Arial" panose="020B0604020202020204" pitchFamily="34" charset="0"/>
+              <a:cs typeface="Arial" pitchFamily="34" charset="0"/>
+            </a:endParaRPr>
+          </a:p>
+        </p:txBody>
+      </p:sp>
+      <p:sp>
+        <p:nvSpPr>
+          <p:cNvPr id="73" name="NumberBall"/>
+          <p:cNvSpPr>
+            <a:spLocks noChangeArrowheads="1"/>
+          </p:cNvSpPr>
+          <p:nvPr/>
+        </p:nvSpPr>
+        <p:spPr bwMode="gray">
+          <a:xfrm>
+            <a:off x="867072" y="3943409"/>
+            <a:ext cx="295275" cy="295275"/>
+          </a:xfrm>
+          <a:prstGeom prst="ellipse">
+            <a:avLst/>
+          </a:prstGeom>
+          <a:solidFill>
+            <a:srgbClr val="4472C4"/>
+          </a:solidFill>
+          <a:ln w="9525">
+            <a:solidFill>
+              <a:schemeClr val="bg1"/>
+            </a:solidFill>
+          </a:ln>
+        </p:spPr>
+        <p:style>
+          <a:lnRef idx="2">
+            <a:schemeClr val="accent1">
+              <a:shade val="50000"/>
+            </a:schemeClr>
+          </a:lnRef>
+          <a:fillRef idx="1">
+            <a:schemeClr val="accent1"/>
+          </a:fillRef>
+          <a:effectRef idx="0">
+            <a:schemeClr val="accent1"/>
+          </a:effectRef>
+          <a:fontRef idx="minor">
+            <a:schemeClr val="lt1"/>
+          </a:fontRef>
+        </p:style>
+        <p:txBody>
+          <a:bodyPr rot="0" spcFirstLastPara="0" vertOverflow="overflow" horzOverflow="overflow" vert="horz" wrap="none" lIns="0" tIns="0" rIns="0" bIns="0" numCol="1" spcCol="0" rtlCol="0" fromWordArt="0" anchor="ctr" anchorCtr="0" forceAA="0" compatLnSpc="1">
+            <a:prstTxWarp prst="textNoShape">
+              <a:avLst/>
+            </a:prstTxWarp>
+            <a:noAutofit/>
+          </a:bodyPr>
+          <a:lstStyle/>
+          <a:p>
+            <a:pPr lvl="0" algn="ctr"/>
+            <a:r>
+              <a:rPr lang="en-US" sz="1200" b="1" dirty="0" smtClean="0">
+                <a:solidFill>
+                  <a:srgbClr val="FFFFFF"/>
+                </a:solidFill>
+                <a:latin typeface="Arial" panose="020B0604020202020204" pitchFamily="34" charset="0"/>
+                <a:cs typeface="Arial" pitchFamily="34" charset="0"/>
+              </a:rPr>
+              <a:t>1.1</a:t>
+            </a:r>
+            <a:endParaRPr lang="en-US" sz="1200" b="1" dirty="0">
+              <a:solidFill>
+                <a:srgbClr val="FFFFFF"/>
+              </a:solidFill>
+              <a:latin typeface="Arial" panose="020B0604020202020204" pitchFamily="34" charset="0"/>
+              <a:cs typeface="Arial" pitchFamily="34" charset="0"/>
+            </a:endParaRPr>
+          </a:p>
+        </p:txBody>
+      </p:sp>
+      <p:sp>
+        <p:nvSpPr>
+          <p:cNvPr id="74" name="NumberBall"/>
+          <p:cNvSpPr>
+            <a:spLocks noChangeArrowheads="1"/>
+          </p:cNvSpPr>
+          <p:nvPr/>
+        </p:nvSpPr>
+        <p:spPr bwMode="gray">
+          <a:xfrm>
+            <a:off x="4815835" y="3943409"/>
+            <a:ext cx="295275" cy="295275"/>
+          </a:xfrm>
+          <a:prstGeom prst="ellipse">
+            <a:avLst/>
+          </a:prstGeom>
+          <a:solidFill>
+            <a:srgbClr val="4472C4"/>
+          </a:solidFill>
+          <a:ln w="9525">
+            <a:solidFill>
+              <a:schemeClr val="bg1"/>
+            </a:solidFill>
+          </a:ln>
+        </p:spPr>
+        <p:style>
+          <a:lnRef idx="2">
+            <a:schemeClr val="accent1">
+              <a:shade val="50000"/>
+            </a:schemeClr>
+          </a:lnRef>
+          <a:fillRef idx="1">
+            <a:schemeClr val="accent1"/>
+          </a:fillRef>
+          <a:effectRef idx="0">
+            <a:schemeClr val="accent1"/>
+          </a:effectRef>
+          <a:fontRef idx="minor">
+            <a:schemeClr val="lt1"/>
+          </a:fontRef>
+        </p:style>
+        <p:txBody>
+          <a:bodyPr rot="0" spcFirstLastPara="0" vertOverflow="overflow" horzOverflow="overflow" vert="horz" wrap="none" lIns="0" tIns="0" rIns="0" bIns="0" numCol="1" spcCol="0" rtlCol="0" fromWordArt="0" anchor="ctr" anchorCtr="0" forceAA="0" compatLnSpc="1">
+            <a:prstTxWarp prst="textNoShape">
+              <a:avLst/>
+            </a:prstTxWarp>
+            <a:noAutofit/>
+          </a:bodyPr>
+          <a:lstStyle/>
+          <a:p>
+            <a:pPr lvl="0" algn="ctr"/>
+            <a:r>
+              <a:rPr lang="en-US" sz="1200" b="1" dirty="0" smtClean="0">
+                <a:solidFill>
+                  <a:srgbClr val="FFFFFF"/>
+                </a:solidFill>
+                <a:latin typeface="Arial" panose="020B0604020202020204" pitchFamily="34" charset="0"/>
+                <a:cs typeface="Arial" pitchFamily="34" charset="0"/>
+              </a:rPr>
+              <a:t>2.1</a:t>
+            </a:r>
+            <a:endParaRPr lang="en-US" sz="1200" b="1" dirty="0">
+              <a:solidFill>
+                <a:srgbClr val="FFFFFF"/>
+              </a:solidFill>
+              <a:latin typeface="Arial" panose="020B0604020202020204" pitchFamily="34" charset="0"/>
+              <a:cs typeface="Arial" pitchFamily="34" charset="0"/>
+            </a:endParaRPr>
+          </a:p>
+        </p:txBody>
+      </p:sp>
+      <p:sp>
+        <p:nvSpPr>
+          <p:cNvPr id="75" name="NumberBall"/>
+          <p:cNvSpPr>
+            <a:spLocks noChangeArrowheads="1"/>
+          </p:cNvSpPr>
+          <p:nvPr/>
+        </p:nvSpPr>
+        <p:spPr bwMode="gray">
+          <a:xfrm>
+            <a:off x="6982900" y="3943409"/>
+            <a:ext cx="295275" cy="295275"/>
+          </a:xfrm>
+          <a:prstGeom prst="ellipse">
+            <a:avLst/>
+          </a:prstGeom>
+          <a:solidFill>
+            <a:srgbClr val="4472C4"/>
+          </a:solidFill>
+          <a:ln w="9525">
+            <a:solidFill>
+              <a:schemeClr val="bg1"/>
+            </a:solidFill>
+          </a:ln>
+        </p:spPr>
+        <p:style>
+          <a:lnRef idx="2">
+            <a:schemeClr val="accent1">
+              <a:shade val="50000"/>
+            </a:schemeClr>
+          </a:lnRef>
+          <a:fillRef idx="1">
+            <a:schemeClr val="accent1"/>
+          </a:fillRef>
+          <a:effectRef idx="0">
+            <a:schemeClr val="accent1"/>
+          </a:effectRef>
+          <a:fontRef idx="minor">
+            <a:schemeClr val="lt1"/>
+          </a:fontRef>
+        </p:style>
+        <p:txBody>
+          <a:bodyPr rot="0" spcFirstLastPara="0" vertOverflow="overflow" horzOverflow="overflow" vert="horz" wrap="none" lIns="0" tIns="0" rIns="0" bIns="0" numCol="1" spcCol="0" rtlCol="0" fromWordArt="0" anchor="ctr" anchorCtr="0" forceAA="0" compatLnSpc="1">
+            <a:prstTxWarp prst="textNoShape">
+              <a:avLst/>
+            </a:prstTxWarp>
+            <a:noAutofit/>
+          </a:bodyPr>
+          <a:lstStyle/>
+          <a:p>
+            <a:pPr lvl="0" algn="ctr"/>
+            <a:r>
+              <a:rPr lang="en-US" sz="1200" b="1" dirty="0" smtClean="0">
+                <a:solidFill>
+                  <a:srgbClr val="FFFFFF"/>
+                </a:solidFill>
+                <a:latin typeface="Arial" panose="020B0604020202020204" pitchFamily="34" charset="0"/>
+                <a:cs typeface="Arial" pitchFamily="34" charset="0"/>
+              </a:rPr>
+              <a:t>3.1</a:t>
+            </a:r>
+            <a:endParaRPr lang="en-US" sz="1200" b="1" dirty="0">
+              <a:solidFill>
+                <a:srgbClr val="FFFFFF"/>
+              </a:solidFill>
+              <a:latin typeface="Arial" panose="020B0604020202020204" pitchFamily="34" charset="0"/>
+              <a:cs typeface="Arial" pitchFamily="34" charset="0"/>
+            </a:endParaRPr>
+          </a:p>
+        </p:txBody>
+      </p:sp>
+      <p:sp>
+        <p:nvSpPr>
+          <p:cNvPr id="76" name="NumberBall"/>
+          <p:cNvSpPr>
+            <a:spLocks noChangeArrowheads="1"/>
+          </p:cNvSpPr>
+          <p:nvPr/>
+        </p:nvSpPr>
+        <p:spPr bwMode="gray">
+          <a:xfrm>
+            <a:off x="867072" y="4590180"/>
+            <a:ext cx="295275" cy="295275"/>
+          </a:xfrm>
+          <a:prstGeom prst="ellipse">
+            <a:avLst/>
+          </a:prstGeom>
+          <a:solidFill>
+            <a:srgbClr val="4472C4"/>
+          </a:solidFill>
+          <a:ln w="9525">
+            <a:solidFill>
+              <a:schemeClr val="bg1"/>
+            </a:solidFill>
+          </a:ln>
+        </p:spPr>
+        <p:style>
+          <a:lnRef idx="2">
+            <a:schemeClr val="accent1">
+              <a:shade val="50000"/>
+            </a:schemeClr>
+          </a:lnRef>
+          <a:fillRef idx="1">
+            <a:schemeClr val="accent1"/>
+          </a:fillRef>
+          <a:effectRef idx="0">
+            <a:schemeClr val="accent1"/>
+          </a:effectRef>
+          <a:fontRef idx="minor">
+            <a:schemeClr val="lt1"/>
+          </a:fontRef>
+        </p:style>
+        <p:txBody>
+          <a:bodyPr rot="0" spcFirstLastPara="0" vertOverflow="overflow" horzOverflow="overflow" vert="horz" wrap="none" lIns="0" tIns="0" rIns="0" bIns="0" numCol="1" spcCol="0" rtlCol="0" fromWordArt="0" anchor="ctr" anchorCtr="0" forceAA="0" compatLnSpc="1">
+            <a:prstTxWarp prst="textNoShape">
+              <a:avLst/>
+            </a:prstTxWarp>
+            <a:noAutofit/>
+          </a:bodyPr>
+          <a:lstStyle/>
+          <a:p>
+            <a:pPr lvl="0" algn="ctr"/>
+            <a:r>
+              <a:rPr lang="en-US" sz="1200" b="1" dirty="0" smtClean="0">
+                <a:solidFill>
+                  <a:srgbClr val="FFFFFF"/>
+                </a:solidFill>
+                <a:latin typeface="Arial" panose="020B0604020202020204" pitchFamily="34" charset="0"/>
+                <a:cs typeface="Arial" pitchFamily="34" charset="0"/>
+              </a:rPr>
+              <a:t>1.2</a:t>
+            </a:r>
+            <a:endParaRPr lang="en-US" sz="1200" b="1" dirty="0">
+              <a:solidFill>
+                <a:srgbClr val="FFFFFF"/>
+              </a:solidFill>
+              <a:latin typeface="Arial" panose="020B0604020202020204" pitchFamily="34" charset="0"/>
+              <a:cs typeface="Arial" pitchFamily="34" charset="0"/>
+            </a:endParaRPr>
+          </a:p>
+        </p:txBody>
+      </p:sp>
+      <p:sp>
+        <p:nvSpPr>
+          <p:cNvPr id="77" name="NumberBall"/>
+          <p:cNvSpPr>
+            <a:spLocks noChangeArrowheads="1"/>
+          </p:cNvSpPr>
+          <p:nvPr/>
+        </p:nvSpPr>
+        <p:spPr bwMode="gray">
+          <a:xfrm>
+            <a:off x="4815835" y="4590180"/>
+            <a:ext cx="295275" cy="295275"/>
+          </a:xfrm>
+          <a:prstGeom prst="ellipse">
+            <a:avLst/>
+          </a:prstGeom>
+          <a:solidFill>
+            <a:srgbClr val="4472C4"/>
+          </a:solidFill>
+          <a:ln w="9525">
+            <a:solidFill>
+              <a:schemeClr val="bg1"/>
+            </a:solidFill>
+          </a:ln>
+        </p:spPr>
+        <p:style>
+          <a:lnRef idx="2">
+            <a:schemeClr val="accent1">
+              <a:shade val="50000"/>
+            </a:schemeClr>
+          </a:lnRef>
+          <a:fillRef idx="1">
+            <a:schemeClr val="accent1"/>
+          </a:fillRef>
+          <a:effectRef idx="0">
+            <a:schemeClr val="accent1"/>
+          </a:effectRef>
+          <a:fontRef idx="minor">
+            <a:schemeClr val="lt1"/>
+          </a:fontRef>
+        </p:style>
+        <p:txBody>
+          <a:bodyPr rot="0" spcFirstLastPara="0" vertOverflow="overflow" horzOverflow="overflow" vert="horz" wrap="none" lIns="0" tIns="0" rIns="0" bIns="0" numCol="1" spcCol="0" rtlCol="0" fromWordArt="0" anchor="ctr" anchorCtr="0" forceAA="0" compatLnSpc="1">
+            <a:prstTxWarp prst="textNoShape">
+              <a:avLst/>
+            </a:prstTxWarp>
+            <a:noAutofit/>
+          </a:bodyPr>
+          <a:lstStyle/>
+          <a:p>
+            <a:pPr lvl="0" algn="ctr"/>
+            <a:r>
+              <a:rPr lang="en-US" sz="1200" b="1" dirty="0" smtClean="0">
+                <a:solidFill>
+                  <a:srgbClr val="FFFFFF"/>
+                </a:solidFill>
+                <a:latin typeface="Arial" panose="020B0604020202020204" pitchFamily="34" charset="0"/>
+                <a:cs typeface="Arial" pitchFamily="34" charset="0"/>
+              </a:rPr>
+              <a:t>2.2</a:t>
+            </a:r>
+            <a:endParaRPr lang="en-US" sz="1200" b="1" dirty="0">
+              <a:solidFill>
+                <a:srgbClr val="FFFFFF"/>
+              </a:solidFill>
+              <a:latin typeface="Arial" panose="020B0604020202020204" pitchFamily="34" charset="0"/>
+              <a:cs typeface="Arial" pitchFamily="34" charset="0"/>
+            </a:endParaRPr>
+          </a:p>
+        </p:txBody>
+      </p:sp>
+      <p:sp>
+        <p:nvSpPr>
+          <p:cNvPr id="78" name="NumberBall"/>
+          <p:cNvSpPr>
+            <a:spLocks noChangeArrowheads="1"/>
+          </p:cNvSpPr>
+          <p:nvPr/>
+        </p:nvSpPr>
+        <p:spPr bwMode="gray">
+          <a:xfrm>
+            <a:off x="6982900" y="4590180"/>
+            <a:ext cx="295275" cy="295275"/>
+          </a:xfrm>
+          <a:prstGeom prst="ellipse">
+            <a:avLst/>
+          </a:prstGeom>
+          <a:solidFill>
+            <a:srgbClr val="4472C4"/>
+          </a:solidFill>
+          <a:ln w="9525">
+            <a:solidFill>
+              <a:schemeClr val="bg1"/>
+            </a:solidFill>
+          </a:ln>
+        </p:spPr>
+        <p:style>
+          <a:lnRef idx="2">
+            <a:schemeClr val="accent1">
+              <a:shade val="50000"/>
+            </a:schemeClr>
+          </a:lnRef>
+          <a:fillRef idx="1">
+            <a:schemeClr val="accent1"/>
+          </a:fillRef>
+          <a:effectRef idx="0">
+            <a:schemeClr val="accent1"/>
+          </a:effectRef>
+          <a:fontRef idx="minor">
+            <a:schemeClr val="lt1"/>
+          </a:fontRef>
+        </p:style>
+        <p:txBody>
+          <a:bodyPr rot="0" spcFirstLastPara="0" vertOverflow="overflow" horzOverflow="overflow" vert="horz" wrap="none" lIns="0" tIns="0" rIns="0" bIns="0" numCol="1" spcCol="0" rtlCol="0" fromWordArt="0" anchor="ctr" anchorCtr="0" forceAA="0" compatLnSpc="1">
+            <a:prstTxWarp prst="textNoShape">
+              <a:avLst/>
+            </a:prstTxWarp>
+            <a:noAutofit/>
+          </a:bodyPr>
+          <a:lstStyle/>
+          <a:p>
+            <a:pPr lvl="0" algn="ctr"/>
+            <a:r>
+              <a:rPr lang="en-US" sz="1200" b="1" dirty="0" smtClean="0">
+                <a:solidFill>
+                  <a:srgbClr val="FFFFFF"/>
+                </a:solidFill>
+                <a:latin typeface="Arial" panose="020B0604020202020204" pitchFamily="34" charset="0"/>
+                <a:cs typeface="Arial" pitchFamily="34" charset="0"/>
+              </a:rPr>
+              <a:t>3.2</a:t>
+            </a:r>
+            <a:endParaRPr lang="en-US" sz="1200" b="1" dirty="0">
+              <a:solidFill>
+                <a:srgbClr val="FFFFFF"/>
+              </a:solidFill>
+              <a:latin typeface="Arial" panose="020B0604020202020204" pitchFamily="34" charset="0"/>
+              <a:cs typeface="Arial" pitchFamily="34" charset="0"/>
+            </a:endParaRPr>
+          </a:p>
+        </p:txBody>
+      </p:sp>
+      <p:sp>
+        <p:nvSpPr>
+          <p:cNvPr id="79" name="NumberBall"/>
+          <p:cNvSpPr>
+            <a:spLocks noChangeArrowheads="1"/>
+          </p:cNvSpPr>
+          <p:nvPr/>
+        </p:nvSpPr>
+        <p:spPr bwMode="gray">
+          <a:xfrm>
+            <a:off x="867072" y="5243149"/>
+            <a:ext cx="295275" cy="295275"/>
+          </a:xfrm>
+          <a:prstGeom prst="ellipse">
+            <a:avLst/>
+          </a:prstGeom>
+          <a:solidFill>
+            <a:srgbClr val="4472C4"/>
+          </a:solidFill>
+          <a:ln w="9525">
+            <a:solidFill>
+              <a:schemeClr val="bg1"/>
+            </a:solidFill>
+          </a:ln>
+        </p:spPr>
+        <p:style>
+          <a:lnRef idx="2">
+            <a:schemeClr val="accent1">
+              <a:shade val="50000"/>
+            </a:schemeClr>
+          </a:lnRef>
+          <a:fillRef idx="1">
+            <a:schemeClr val="accent1"/>
+          </a:fillRef>
+          <a:effectRef idx="0">
+            <a:schemeClr val="accent1"/>
+          </a:effectRef>
+          <a:fontRef idx="minor">
+            <a:schemeClr val="lt1"/>
+          </a:fontRef>
+        </p:style>
+        <p:txBody>
+          <a:bodyPr rot="0" spcFirstLastPara="0" vertOverflow="overflow" horzOverflow="overflow" vert="horz" wrap="none" lIns="0" tIns="0" rIns="0" bIns="0" numCol="1" spcCol="0" rtlCol="0" fromWordArt="0" anchor="ctr" anchorCtr="0" forceAA="0" compatLnSpc="1">
+            <a:prstTxWarp prst="textNoShape">
+              <a:avLst/>
+            </a:prstTxWarp>
+            <a:noAutofit/>
+          </a:bodyPr>
+          <a:lstStyle/>
+          <a:p>
+            <a:pPr lvl="0" algn="ctr"/>
+            <a:r>
+              <a:rPr lang="en-US" sz="1200" b="1" dirty="0" smtClean="0">
+                <a:solidFill>
+                  <a:srgbClr val="FFFFFF"/>
+                </a:solidFill>
+                <a:latin typeface="Arial" panose="020B0604020202020204" pitchFamily="34" charset="0"/>
+                <a:cs typeface="Arial" pitchFamily="34" charset="0"/>
+              </a:rPr>
+              <a:t>1.3</a:t>
+            </a:r>
+            <a:endParaRPr lang="en-US" sz="1200" b="1" dirty="0">
+              <a:solidFill>
+                <a:srgbClr val="FFFFFF"/>
+              </a:solidFill>
+              <a:latin typeface="Arial" panose="020B0604020202020204" pitchFamily="34" charset="0"/>
+              <a:cs typeface="Arial" pitchFamily="34" charset="0"/>
+            </a:endParaRPr>
+          </a:p>
+        </p:txBody>
+      </p:sp>
+      <p:sp>
+        <p:nvSpPr>
+          <p:cNvPr id="80" name="NumberBall"/>
+          <p:cNvSpPr>
+            <a:spLocks noChangeArrowheads="1"/>
+          </p:cNvSpPr>
+          <p:nvPr/>
+        </p:nvSpPr>
+        <p:spPr bwMode="gray">
+          <a:xfrm>
+            <a:off x="867072" y="5893508"/>
+            <a:ext cx="295275" cy="295275"/>
+          </a:xfrm>
+          <a:prstGeom prst="ellipse">
+            <a:avLst/>
+          </a:prstGeom>
+          <a:solidFill>
+            <a:srgbClr val="4472C4"/>
+          </a:solidFill>
+          <a:ln w="9525">
+            <a:solidFill>
+              <a:schemeClr val="bg1"/>
+            </a:solidFill>
+          </a:ln>
+        </p:spPr>
+        <p:style>
+          <a:lnRef idx="2">
+            <a:schemeClr val="accent1">
+              <a:shade val="50000"/>
+            </a:schemeClr>
+          </a:lnRef>
+          <a:fillRef idx="1">
+            <a:schemeClr val="accent1"/>
+          </a:fillRef>
+          <a:effectRef idx="0">
+            <a:schemeClr val="accent1"/>
+          </a:effectRef>
+          <a:fontRef idx="minor">
+            <a:schemeClr val="lt1"/>
+          </a:fontRef>
+        </p:style>
+        <p:txBody>
+          <a:bodyPr rot="0" spcFirstLastPara="0" vertOverflow="overflow" horzOverflow="overflow" vert="horz" wrap="none" lIns="0" tIns="0" rIns="0" bIns="0" numCol="1" spcCol="0" rtlCol="0" fromWordArt="0" anchor="ctr" anchorCtr="0" forceAA="0" compatLnSpc="1">
+            <a:prstTxWarp prst="textNoShape">
+              <a:avLst/>
+            </a:prstTxWarp>
+            <a:noAutofit/>
+          </a:bodyPr>
+          <a:lstStyle/>
+          <a:p>
+            <a:pPr lvl="0" algn="ctr"/>
+            <a:r>
+              <a:rPr lang="en-US" sz="1200" b="1" dirty="0" smtClean="0">
+                <a:solidFill>
+                  <a:srgbClr val="FFFFFF"/>
+                </a:solidFill>
+                <a:latin typeface="Arial" panose="020B0604020202020204" pitchFamily="34" charset="0"/>
+                <a:cs typeface="Arial" pitchFamily="34" charset="0"/>
+              </a:rPr>
+              <a:t>1.4</a:t>
+            </a:r>
+            <a:endParaRPr lang="en-US" sz="1200" b="1" dirty="0">
+              <a:solidFill>
+                <a:srgbClr val="FFFFFF"/>
+              </a:solidFill>
+              <a:latin typeface="Arial" panose="020B0604020202020204" pitchFamily="34" charset="0"/>
+              <a:cs typeface="Arial" pitchFamily="34" charset="0"/>
+            </a:endParaRPr>
+          </a:p>
+        </p:txBody>
+      </p:sp>
+      <p:sp>
+        <p:nvSpPr>
+          <p:cNvPr id="81" name="NumberBall"/>
+          <p:cNvSpPr>
+            <a:spLocks noChangeArrowheads="1"/>
+          </p:cNvSpPr>
+          <p:nvPr/>
+        </p:nvSpPr>
+        <p:spPr bwMode="gray">
+          <a:xfrm>
+            <a:off x="2688958" y="3943409"/>
+            <a:ext cx="295275" cy="295275"/>
+          </a:xfrm>
+          <a:prstGeom prst="ellipse">
+            <a:avLst/>
+          </a:prstGeom>
+          <a:solidFill>
+            <a:srgbClr val="4472C4"/>
+          </a:solidFill>
+          <a:ln w="9525">
+            <a:solidFill>
+              <a:schemeClr val="bg1"/>
+            </a:solidFill>
+          </a:ln>
+        </p:spPr>
+        <p:style>
+          <a:lnRef idx="2">
+            <a:schemeClr val="accent1">
+              <a:shade val="50000"/>
+            </a:schemeClr>
+          </a:lnRef>
+          <a:fillRef idx="1">
+            <a:schemeClr val="accent1"/>
+          </a:fillRef>
+          <a:effectRef idx="0">
+            <a:schemeClr val="accent1"/>
+          </a:effectRef>
+          <a:fontRef idx="minor">
+            <a:schemeClr val="lt1"/>
+          </a:fontRef>
+        </p:style>
+        <p:txBody>
+          <a:bodyPr rot="0" spcFirstLastPara="0" vertOverflow="overflow" horzOverflow="overflow" vert="horz" wrap="none" lIns="0" tIns="0" rIns="0" bIns="0" numCol="1" spcCol="0" rtlCol="0" fromWordArt="0" anchor="ctr" anchorCtr="0" forceAA="0" compatLnSpc="1">
+            <a:prstTxWarp prst="textNoShape">
+              <a:avLst/>
+            </a:prstTxWarp>
+            <a:noAutofit/>
+          </a:bodyPr>
+          <a:lstStyle/>
+          <a:p>
+            <a:pPr lvl="0" algn="ctr"/>
+            <a:r>
+              <a:rPr lang="en-US" sz="1200" b="1" dirty="0" smtClean="0">
+                <a:solidFill>
+                  <a:srgbClr val="FFFFFF"/>
+                </a:solidFill>
+                <a:latin typeface="Arial" panose="020B0604020202020204" pitchFamily="34" charset="0"/>
+                <a:cs typeface="Arial" pitchFamily="34" charset="0"/>
+              </a:rPr>
+              <a:t>1.5</a:t>
+            </a:r>
+            <a:endParaRPr lang="en-US" sz="1200" b="1" dirty="0">
+              <a:solidFill>
+                <a:srgbClr val="FFFFFF"/>
+              </a:solidFill>
+              <a:latin typeface="Arial" panose="020B0604020202020204" pitchFamily="34" charset="0"/>
+              <a:cs typeface="Arial" pitchFamily="34" charset="0"/>
+            </a:endParaRPr>
+          </a:p>
+        </p:txBody>
+      </p:sp>
+      <p:sp>
+        <p:nvSpPr>
+          <p:cNvPr id="82" name="NumberBall"/>
+          <p:cNvSpPr>
+            <a:spLocks noChangeArrowheads="1"/>
+          </p:cNvSpPr>
+          <p:nvPr/>
+        </p:nvSpPr>
+        <p:spPr bwMode="gray">
+          <a:xfrm>
+            <a:off x="2688958" y="4590180"/>
+            <a:ext cx="295275" cy="295275"/>
+          </a:xfrm>
+          <a:prstGeom prst="ellipse">
+            <a:avLst/>
+          </a:prstGeom>
+          <a:solidFill>
+            <a:srgbClr val="4472C4"/>
+          </a:solidFill>
+          <a:ln w="9525">
+            <a:solidFill>
+              <a:schemeClr val="bg1"/>
+            </a:solidFill>
+          </a:ln>
+        </p:spPr>
+        <p:style>
+          <a:lnRef idx="2">
+            <a:schemeClr val="accent1">
+              <a:shade val="50000"/>
+            </a:schemeClr>
+          </a:lnRef>
+          <a:fillRef idx="1">
+            <a:schemeClr val="accent1"/>
+          </a:fillRef>
+          <a:effectRef idx="0">
+            <a:schemeClr val="accent1"/>
+          </a:effectRef>
+          <a:fontRef idx="minor">
+            <a:schemeClr val="lt1"/>
+          </a:fontRef>
+        </p:style>
+        <p:txBody>
+          <a:bodyPr rot="0" spcFirstLastPara="0" vertOverflow="overflow" horzOverflow="overflow" vert="horz" wrap="none" lIns="0" tIns="0" rIns="0" bIns="0" numCol="1" spcCol="0" rtlCol="0" fromWordArt="0" anchor="ctr" anchorCtr="0" forceAA="0" compatLnSpc="1">
+            <a:prstTxWarp prst="textNoShape">
+              <a:avLst/>
+            </a:prstTxWarp>
+            <a:noAutofit/>
+          </a:bodyPr>
+          <a:lstStyle/>
+          <a:p>
+            <a:pPr lvl="0" algn="ctr"/>
+            <a:r>
+              <a:rPr lang="en-US" sz="1200" b="1" dirty="0" smtClean="0">
+                <a:solidFill>
+                  <a:srgbClr val="FFFFFF"/>
+                </a:solidFill>
+                <a:latin typeface="Arial" panose="020B0604020202020204" pitchFamily="34" charset="0"/>
+                <a:cs typeface="Arial" pitchFamily="34" charset="0"/>
+              </a:rPr>
+              <a:t>1.6</a:t>
+            </a:r>
+            <a:endParaRPr lang="en-US" sz="1200" b="1" dirty="0">
+              <a:solidFill>
+                <a:srgbClr val="FFFFFF"/>
+              </a:solidFill>
+              <a:latin typeface="Arial" panose="020B0604020202020204" pitchFamily="34" charset="0"/>
+              <a:cs typeface="Arial" pitchFamily="34" charset="0"/>
+            </a:endParaRPr>
+          </a:p>
+        </p:txBody>
+      </p:sp>
+      <p:sp>
+        <p:nvSpPr>
+          <p:cNvPr id="83" name="NumberBall"/>
+          <p:cNvSpPr>
+            <a:spLocks noChangeArrowheads="1"/>
+          </p:cNvSpPr>
+          <p:nvPr/>
+        </p:nvSpPr>
+        <p:spPr bwMode="gray">
+          <a:xfrm>
+            <a:off x="2688958" y="5243149"/>
+            <a:ext cx="295275" cy="295275"/>
+          </a:xfrm>
+          <a:prstGeom prst="ellipse">
+            <a:avLst/>
+          </a:prstGeom>
+          <a:solidFill>
+            <a:srgbClr val="4472C4"/>
+          </a:solidFill>
+          <a:ln w="9525">
+            <a:solidFill>
+              <a:schemeClr val="bg1"/>
+            </a:solidFill>
+          </a:ln>
+        </p:spPr>
+        <p:style>
+          <a:lnRef idx="2">
+            <a:schemeClr val="accent1">
+              <a:shade val="50000"/>
+            </a:schemeClr>
+          </a:lnRef>
+          <a:fillRef idx="1">
+            <a:schemeClr val="accent1"/>
+          </a:fillRef>
+          <a:effectRef idx="0">
+            <a:schemeClr val="accent1"/>
+          </a:effectRef>
+          <a:fontRef idx="minor">
+            <a:schemeClr val="lt1"/>
+          </a:fontRef>
+        </p:style>
+        <p:txBody>
+          <a:bodyPr rot="0" spcFirstLastPara="0" vertOverflow="overflow" horzOverflow="overflow" vert="horz" wrap="none" lIns="0" tIns="0" rIns="0" bIns="0" numCol="1" spcCol="0" rtlCol="0" fromWordArt="0" anchor="ctr" anchorCtr="0" forceAA="0" compatLnSpc="1">
+            <a:prstTxWarp prst="textNoShape">
+              <a:avLst/>
+            </a:prstTxWarp>
+            <a:noAutofit/>
+          </a:bodyPr>
+          <a:lstStyle/>
+          <a:p>
+            <a:pPr lvl="0" algn="ctr"/>
+            <a:r>
+              <a:rPr lang="en-US" sz="1200" b="1" dirty="0" smtClean="0">
+                <a:solidFill>
+                  <a:srgbClr val="FFFFFF"/>
+                </a:solidFill>
+                <a:latin typeface="Arial" panose="020B0604020202020204" pitchFamily="34" charset="0"/>
+                <a:cs typeface="Arial" pitchFamily="34" charset="0"/>
+              </a:rPr>
+              <a:t>1.7</a:t>
+            </a:r>
+            <a:endParaRPr lang="en-US" sz="1200" b="1" dirty="0">
+              <a:solidFill>
+                <a:srgbClr val="FFFFFF"/>
+              </a:solidFill>
+              <a:latin typeface="Arial" panose="020B0604020202020204" pitchFamily="34" charset="0"/>
+              <a:cs typeface="Arial" pitchFamily="34" charset="0"/>
+            </a:endParaRPr>
+          </a:p>
+        </p:txBody>
+      </p:sp>
+    </p:spTree>
+    <p:extLst>
+      <p:ext uri="{BB962C8B-B14F-4D97-AF65-F5344CB8AC3E}">
+        <p14:creationId xmlns:p14="http://schemas.microsoft.com/office/powerpoint/2010/main" val="855132440"/>
+      </p:ext>
+    </p:extLst>
+  </p:cSld>
+  <p:clrMapOvr>
+    <a:masterClrMapping/>
+  </p:clrMapOvr>
+  <p:timing>
+    <p:tnLst>
+      <p:par>
+        <p:cTn id="1" dur="indefinite" restart="never" nodeType="tmRoot"/>
+      </p:par>
+    </p:tnLst>
+  </p:timing>
+</p:sld>
+</file>
+
+<file path=ppt/slides/slide9.xml><?xml version="1.0" encoding="utf-8"?>
+<p:sld xmlns:a="http://schemas.openxmlformats.org/drawingml/2006/main" xmlns:r="http://schemas.openxmlformats.org/officeDocument/2006/relationships" xmlns:p="http://schemas.openxmlformats.org/presentationml/2006/main">
+  <p:cSld>
+    <p:spTree>
+      <p:nvGrpSpPr>
+        <p:cNvPr id="1" name=""/>
+        <p:cNvGrpSpPr/>
+        <p:nvPr/>
+      </p:nvGrpSpPr>
+      <p:grpSpPr>
+        <a:xfrm>
+          <a:off x="0" y="0"/>
+          <a:ext cx="0" cy="0"/>
+          <a:chOff x="0" y="0"/>
+          <a:chExt cx="0" cy="0"/>
+        </a:xfrm>
+      </p:grpSpPr>
+      <p:graphicFrame>
+        <p:nvGraphicFramePr>
+          <p:cNvPr id="3" name="Object 2" hidden="1"/>
+          <p:cNvGraphicFramePr>
+            <a:graphicFrameLocks/>
+          </p:cNvGraphicFramePr>
+          <p:nvPr>
+            <p:custDataLst>
+              <p:tags r:id="rId2"/>
+            </p:custDataLst>
+            <p:extLst>
+              <p:ext uri="{D42A27DB-BD31-4B8C-83A1-F6EECF244321}">
+                <p14:modId xmlns:p14="http://schemas.microsoft.com/office/powerpoint/2010/main" val="486191937"/>
+              </p:ext>
+            </p:extLst>
+          </p:nvPr>
+        </p:nvGraphicFramePr>
+        <p:xfrm>
+          <a:off x="1588" y="1588"/>
+          <a:ext cx="1587" cy="1587"/>
+        </p:xfrm>
+        <a:graphic>
+          <a:graphicData uri="http://schemas.openxmlformats.org/presentationml/2006/ole">
+            <mc:AlternateContent xmlns:mc="http://schemas.openxmlformats.org/markup-compatibility/2006">
+              <mc:Choice xmlns:v="urn:schemas-microsoft-com:vml" Requires="v">
+                <p:oleObj spid="_x0000_s34828" name="think-cell Slide" r:id="rId5" imgW="270" imgH="270" progId="TCLayout.ActiveDocument.1">
+                  <p:embed/>
+                </p:oleObj>
+              </mc:Choice>
+              <mc:Fallback>
+                <p:oleObj name="think-cell Slide" r:id="rId5" imgW="270" imgH="270" progId="TCLayout.ActiveDocument.1">
+                  <p:embed/>
+                  <p:pic>
+                    <p:nvPicPr>
+                      <p:cNvPr id="0" name=""/>
+                      <p:cNvPicPr/>
+                      <p:nvPr/>
+                    </p:nvPicPr>
+                    <p:blipFill>
+                      <a:blip r:embed="rId6"/>
+                      <a:stretch>
+                        <a:fillRect/>
+                      </a:stretch>
+                    </p:blipFill>
+                    <p:spPr>
+                      <a:xfrm>
+                        <a:off x="1588" y="1588"/>
+                        <a:ext cx="1587" cy="1587"/>
+                      </a:xfrm>
+                      <a:prstGeom prst="rect">
+                        <a:avLst/>
+                      </a:prstGeom>
+                    </p:spPr>
+                  </p:pic>
+                </p:oleObj>
+              </mc:Fallback>
+            </mc:AlternateContent>
+          </a:graphicData>
+        </a:graphic>
+      </p:graphicFrame>
+      <p:sp>
+        <p:nvSpPr>
+          <p:cNvPr id="2" name="Rectangle 1" hidden="1"/>
+          <p:cNvSpPr/>
+          <p:nvPr>
+            <p:custDataLst>
+              <p:tags r:id="rId3"/>
+            </p:custDataLst>
+          </p:nvPr>
+        </p:nvSpPr>
+        <p:spPr bwMode="gray">
+          <a:xfrm>
+            <a:off x="0" y="0"/>
+            <a:ext cx="158750" cy="158750"/>
+          </a:xfrm>
+          <a:prstGeom prst="rect">
+            <a:avLst/>
+          </a:prstGeom>
+          <a:solidFill>
+            <a:schemeClr val="accent1"/>
+          </a:solidFill>
+        </p:spPr>
+        <p:style>
+          <a:lnRef idx="2">
+            <a:schemeClr val="accent1">
+              <a:shade val="50000"/>
+            </a:schemeClr>
+          </a:lnRef>
+          <a:fillRef idx="1">
+            <a:schemeClr val="accent1"/>
+          </a:fillRef>
+          <a:effectRef idx="0">
+            <a:schemeClr val="accent1"/>
+          </a:effectRef>
+          <a:fontRef idx="minor">
+            <a:schemeClr val="lt1"/>
+          </a:fontRef>
+        </p:style>
+        <p:txBody>
+          <a:bodyPr vert="horz" wrap="none" lIns="0" tIns="0" rIns="0" bIns="0" numCol="1" spcCol="0" rtlCol="0" anchor="ctr" anchorCtr="0">
+            <a:noAutofit/>
+          </a:bodyPr>
+          <a:lstStyle/>
+          <a:p>
+            <a:pPr algn="ctr">
+              <a:spcBef>
+                <a:spcPct val="0"/>
+              </a:spcBef>
+              <a:spcAft>
+                <a:spcPct val="0"/>
+              </a:spcAft>
+            </a:pPr>
+            <a:endParaRPr lang="en-US" sz="1000" dirty="0">
+              <a:latin typeface="Technika" panose="020B0604020202020204" charset="-18"/>
+              <a:sym typeface="Technika" panose="020B0604020202020204" charset="-18"/>
+            </a:endParaRPr>
+          </a:p>
+        </p:txBody>
+      </p:sp>
+      <p:pic>
+        <p:nvPicPr>
+          <p:cNvPr id="8" name="Picture 7"/>
+          <p:cNvPicPr>
+            <a:picLocks noChangeAspect="1"/>
+          </p:cNvPicPr>
+          <p:nvPr/>
+        </p:nvPicPr>
+        <p:blipFill>
+          <a:blip r:embed="rId7"/>
+          <a:stretch>
+            <a:fillRect/>
+          </a:stretch>
+        </p:blipFill>
         <p:spPr>
-          <a:xfrm rot="16200000" flipH="1">
-            <a:off x="6484686" y="4349478"/>
-            <a:ext cx="1026286" cy="126277"/>
+          <a:xfrm>
+            <a:off x="2214946" y="2339430"/>
+            <a:ext cx="5063229" cy="4426660"/>
           </a:xfrm>
-          <a:prstGeom prst="bentConnector2">
+          <a:prstGeom prst="rect">
+            <a:avLst/>
+          </a:prstGeom>
+        </p:spPr>
+      </p:pic>
+      <p:sp>
+        <p:nvSpPr>
+          <p:cNvPr id="5" name="Title 4"/>
+          <p:cNvSpPr>
+            <a:spLocks noGrp="1"/>
+          </p:cNvSpPr>
+          <p:nvPr>
+            <p:ph type="title"/>
+          </p:nvPr>
+        </p:nvSpPr>
+        <p:spPr/>
+        <p:txBody>
+          <a:bodyPr/>
+          <a:lstStyle/>
+          <a:p>
+            <a:r>
+              <a:rPr lang="en-US" dirty="0" smtClean="0"/>
+              <a:t>Full Project </a:t>
+            </a:r>
+            <a:r>
+              <a:rPr lang="en-US" dirty="0" smtClean="0"/>
+              <a:t>View</a:t>
+            </a:r>
+            <a:endParaRPr lang="cs-CZ" dirty="0"/>
+          </a:p>
+        </p:txBody>
+      </p:sp>
+      <p:sp>
+        <p:nvSpPr>
+          <p:cNvPr id="44" name="NumberBall"/>
+          <p:cNvSpPr>
+            <a:spLocks noChangeArrowheads="1"/>
+          </p:cNvSpPr>
+          <p:nvPr/>
+        </p:nvSpPr>
+        <p:spPr bwMode="gray">
+          <a:xfrm>
+            <a:off x="2067308" y="2261069"/>
+            <a:ext cx="295275" cy="295275"/>
+          </a:xfrm>
+          <a:prstGeom prst="ellipse">
+            <a:avLst/>
+          </a:prstGeom>
+          <a:solidFill>
+            <a:srgbClr val="4472C4"/>
+          </a:solidFill>
+          <a:ln w="9525">
+            <a:solidFill>
+              <a:schemeClr val="bg1"/>
+            </a:solidFill>
+          </a:ln>
+        </p:spPr>
+        <p:style>
+          <a:lnRef idx="2">
+            <a:schemeClr val="accent1">
+              <a:shade val="50000"/>
+            </a:schemeClr>
+          </a:lnRef>
+          <a:fillRef idx="1">
+            <a:schemeClr val="accent1"/>
+          </a:fillRef>
+          <a:effectRef idx="0">
+            <a:schemeClr val="accent1"/>
+          </a:effectRef>
+          <a:fontRef idx="minor">
+            <a:schemeClr val="lt1"/>
+          </a:fontRef>
+        </p:style>
+        <p:txBody>
+          <a:bodyPr rot="0" spcFirstLastPara="0" vertOverflow="overflow" horzOverflow="overflow" vert="horz" wrap="none" lIns="0" tIns="0" rIns="0" bIns="0" numCol="1" spcCol="0" rtlCol="0" fromWordArt="0" anchor="ctr" anchorCtr="0" forceAA="0" compatLnSpc="1">
+            <a:prstTxWarp prst="textNoShape">
+              <a:avLst/>
+            </a:prstTxWarp>
+            <a:noAutofit/>
+          </a:bodyPr>
+          <a:lstStyle/>
+          <a:p>
+            <a:pPr lvl="0" algn="ctr"/>
+            <a:r>
+              <a:rPr lang="en-US" sz="1600" b="1" dirty="0">
+                <a:solidFill>
+                  <a:srgbClr val="FFFFFF"/>
+                </a:solidFill>
+                <a:latin typeface="Arial" panose="020B0604020202020204" pitchFamily="34" charset="0"/>
+                <a:cs typeface="Arial" pitchFamily="34" charset="0"/>
+              </a:rPr>
+              <a:t>1</a:t>
+            </a:r>
+            <a:endParaRPr lang="en-US" sz="1600" b="1" dirty="0">
+              <a:solidFill>
+                <a:srgbClr val="FFFFFF"/>
+              </a:solidFill>
+              <a:latin typeface="Arial" panose="020B0604020202020204" pitchFamily="34" charset="0"/>
+              <a:cs typeface="Arial" pitchFamily="34" charset="0"/>
+            </a:endParaRPr>
+          </a:p>
+        </p:txBody>
+      </p:sp>
+      <p:sp>
+        <p:nvSpPr>
+          <p:cNvPr id="45" name="NumberBall"/>
+          <p:cNvSpPr>
+            <a:spLocks noChangeArrowheads="1"/>
+          </p:cNvSpPr>
+          <p:nvPr/>
+        </p:nvSpPr>
+        <p:spPr bwMode="gray">
+          <a:xfrm>
+            <a:off x="6231537" y="2121837"/>
+            <a:ext cx="295275" cy="295275"/>
+          </a:xfrm>
+          <a:prstGeom prst="ellipse">
+            <a:avLst/>
+          </a:prstGeom>
+          <a:solidFill>
+            <a:srgbClr val="4472C4"/>
+          </a:solidFill>
+          <a:ln w="9525">
+            <a:solidFill>
+              <a:schemeClr val="bg1"/>
+            </a:solidFill>
+          </a:ln>
+        </p:spPr>
+        <p:style>
+          <a:lnRef idx="2">
+            <a:schemeClr val="accent1">
+              <a:shade val="50000"/>
+            </a:schemeClr>
+          </a:lnRef>
+          <a:fillRef idx="1">
+            <a:schemeClr val="accent1"/>
+          </a:fillRef>
+          <a:effectRef idx="0">
+            <a:schemeClr val="accent1"/>
+          </a:effectRef>
+          <a:fontRef idx="minor">
+            <a:schemeClr val="lt1"/>
+          </a:fontRef>
+        </p:style>
+        <p:txBody>
+          <a:bodyPr rot="0" spcFirstLastPara="0" vertOverflow="overflow" horzOverflow="overflow" vert="horz" wrap="none" lIns="0" tIns="0" rIns="0" bIns="0" numCol="1" spcCol="0" rtlCol="0" fromWordArt="0" anchor="ctr" anchorCtr="0" forceAA="0" compatLnSpc="1">
+            <a:prstTxWarp prst="textNoShape">
+              <a:avLst/>
+            </a:prstTxWarp>
+            <a:noAutofit/>
+          </a:bodyPr>
+          <a:lstStyle/>
+          <a:p>
+            <a:pPr lvl="0" algn="ctr"/>
+            <a:r>
+              <a:rPr lang="en-US" sz="1600" b="1">
+                <a:solidFill>
+                  <a:srgbClr val="FFFFFF"/>
+                </a:solidFill>
+                <a:latin typeface="Arial" panose="020B0604020202020204" pitchFamily="34" charset="0"/>
+                <a:cs typeface="Arial" pitchFamily="34" charset="0"/>
+              </a:rPr>
+              <a:t>2</a:t>
+            </a:r>
+            <a:endParaRPr lang="en-US" sz="1600" b="1" dirty="0">
+              <a:solidFill>
+                <a:srgbClr val="FFFFFF"/>
+              </a:solidFill>
+              <a:latin typeface="Arial" panose="020B0604020202020204" pitchFamily="34" charset="0"/>
+              <a:cs typeface="Arial" pitchFamily="34" charset="0"/>
+            </a:endParaRPr>
+          </a:p>
+        </p:txBody>
+      </p:sp>
+      <p:sp>
+        <p:nvSpPr>
+          <p:cNvPr id="46" name="NumberBall"/>
+          <p:cNvSpPr>
+            <a:spLocks noChangeArrowheads="1"/>
+          </p:cNvSpPr>
+          <p:nvPr/>
+        </p:nvSpPr>
+        <p:spPr bwMode="gray">
+          <a:xfrm>
+            <a:off x="2343083" y="5774714"/>
+            <a:ext cx="295275" cy="295275"/>
+          </a:xfrm>
+          <a:prstGeom prst="ellipse">
+            <a:avLst/>
+          </a:prstGeom>
+          <a:solidFill>
+            <a:srgbClr val="4472C4"/>
+          </a:solidFill>
+          <a:ln w="9525">
+            <a:solidFill>
+              <a:schemeClr val="bg1"/>
+            </a:solidFill>
+          </a:ln>
+        </p:spPr>
+        <p:style>
+          <a:lnRef idx="2">
+            <a:schemeClr val="accent1">
+              <a:shade val="50000"/>
+            </a:schemeClr>
+          </a:lnRef>
+          <a:fillRef idx="1">
+            <a:schemeClr val="accent1"/>
+          </a:fillRef>
+          <a:effectRef idx="0">
+            <a:schemeClr val="accent1"/>
+          </a:effectRef>
+          <a:fontRef idx="minor">
+            <a:schemeClr val="lt1"/>
+          </a:fontRef>
+        </p:style>
+        <p:txBody>
+          <a:bodyPr rot="0" spcFirstLastPara="0" vertOverflow="overflow" horzOverflow="overflow" vert="horz" wrap="none" lIns="0" tIns="0" rIns="0" bIns="0" numCol="1" spcCol="0" rtlCol="0" fromWordArt="0" anchor="ctr" anchorCtr="0" forceAA="0" compatLnSpc="1">
+            <a:prstTxWarp prst="textNoShape">
+              <a:avLst/>
+            </a:prstTxWarp>
+            <a:noAutofit/>
+          </a:bodyPr>
+          <a:lstStyle/>
+          <a:p>
+            <a:pPr lvl="0" algn="ctr"/>
+            <a:r>
+              <a:rPr lang="en-US" sz="1600" b="1">
+                <a:solidFill>
+                  <a:srgbClr val="FFFFFF"/>
+                </a:solidFill>
+                <a:latin typeface="Arial" panose="020B0604020202020204" pitchFamily="34" charset="0"/>
+                <a:cs typeface="Arial" pitchFamily="34" charset="0"/>
+              </a:rPr>
+              <a:t>3</a:t>
+            </a:r>
+            <a:endParaRPr lang="en-US" sz="1600" b="1" dirty="0">
+              <a:solidFill>
+                <a:srgbClr val="FFFFFF"/>
+              </a:solidFill>
+              <a:latin typeface="Arial" panose="020B0604020202020204" pitchFamily="34" charset="0"/>
+              <a:cs typeface="Arial" pitchFamily="34" charset="0"/>
+            </a:endParaRPr>
+          </a:p>
+        </p:txBody>
+      </p:sp>
+      <p:sp>
+        <p:nvSpPr>
+          <p:cNvPr id="47" name="NumberBall"/>
+          <p:cNvSpPr>
+            <a:spLocks noChangeArrowheads="1"/>
+          </p:cNvSpPr>
+          <p:nvPr/>
+        </p:nvSpPr>
+        <p:spPr bwMode="gray">
+          <a:xfrm>
+            <a:off x="2476931" y="2556344"/>
+            <a:ext cx="295275" cy="295275"/>
+          </a:xfrm>
+          <a:prstGeom prst="ellipse">
+            <a:avLst/>
+          </a:prstGeom>
+          <a:solidFill>
+            <a:srgbClr val="4472C4"/>
+          </a:solidFill>
+          <a:ln w="9525">
+            <a:solidFill>
+              <a:schemeClr val="bg1"/>
+            </a:solidFill>
+          </a:ln>
+        </p:spPr>
+        <p:style>
+          <a:lnRef idx="2">
+            <a:schemeClr val="accent1">
+              <a:shade val="50000"/>
+            </a:schemeClr>
+          </a:lnRef>
+          <a:fillRef idx="1">
+            <a:schemeClr val="accent1"/>
+          </a:fillRef>
+          <a:effectRef idx="0">
+            <a:schemeClr val="accent1"/>
+          </a:effectRef>
+          <a:fontRef idx="minor">
+            <a:schemeClr val="lt1"/>
+          </a:fontRef>
+        </p:style>
+        <p:txBody>
+          <a:bodyPr rot="0" spcFirstLastPara="0" vertOverflow="overflow" horzOverflow="overflow" vert="horz" wrap="none" lIns="0" tIns="0" rIns="0" bIns="0" numCol="1" spcCol="0" rtlCol="0" fromWordArt="0" anchor="ctr" anchorCtr="0" forceAA="0" compatLnSpc="1">
+            <a:prstTxWarp prst="textNoShape">
+              <a:avLst/>
+            </a:prstTxWarp>
+            <a:noAutofit/>
+          </a:bodyPr>
+          <a:lstStyle/>
+          <a:p>
+            <a:pPr lvl="0" algn="ctr"/>
+            <a:r>
+              <a:rPr lang="en-US" sz="1200" b="1" dirty="0" smtClean="0">
+                <a:solidFill>
+                  <a:srgbClr val="FFFFFF"/>
+                </a:solidFill>
+                <a:latin typeface="Arial" panose="020B0604020202020204" pitchFamily="34" charset="0"/>
+                <a:cs typeface="Arial" pitchFamily="34" charset="0"/>
+              </a:rPr>
+              <a:t>1.1</a:t>
+            </a:r>
+            <a:endParaRPr lang="en-US" sz="1200" b="1" dirty="0">
+              <a:solidFill>
+                <a:srgbClr val="FFFFFF"/>
+              </a:solidFill>
+              <a:latin typeface="Arial" panose="020B0604020202020204" pitchFamily="34" charset="0"/>
+              <a:cs typeface="Arial" pitchFamily="34" charset="0"/>
+            </a:endParaRPr>
+          </a:p>
+        </p:txBody>
+      </p:sp>
+      <p:sp>
+        <p:nvSpPr>
+          <p:cNvPr id="48" name="NumberBall"/>
+          <p:cNvSpPr>
+            <a:spLocks noChangeArrowheads="1"/>
+          </p:cNvSpPr>
+          <p:nvPr/>
+        </p:nvSpPr>
+        <p:spPr bwMode="gray">
+          <a:xfrm>
+            <a:off x="6528327" y="2359698"/>
+            <a:ext cx="295275" cy="295275"/>
+          </a:xfrm>
+          <a:prstGeom prst="ellipse">
+            <a:avLst/>
+          </a:prstGeom>
+          <a:solidFill>
+            <a:srgbClr val="4472C4"/>
+          </a:solidFill>
+          <a:ln w="9525">
+            <a:solidFill>
+              <a:schemeClr val="bg1"/>
+            </a:solidFill>
+          </a:ln>
+        </p:spPr>
+        <p:style>
+          <a:lnRef idx="2">
+            <a:schemeClr val="accent1">
+              <a:shade val="50000"/>
+            </a:schemeClr>
+          </a:lnRef>
+          <a:fillRef idx="1">
+            <a:schemeClr val="accent1"/>
+          </a:fillRef>
+          <a:effectRef idx="0">
+            <a:schemeClr val="accent1"/>
+          </a:effectRef>
+          <a:fontRef idx="minor">
+            <a:schemeClr val="lt1"/>
+          </a:fontRef>
+        </p:style>
+        <p:txBody>
+          <a:bodyPr rot="0" spcFirstLastPara="0" vertOverflow="overflow" horzOverflow="overflow" vert="horz" wrap="none" lIns="0" tIns="0" rIns="0" bIns="0" numCol="1" spcCol="0" rtlCol="0" fromWordArt="0" anchor="ctr" anchorCtr="0" forceAA="0" compatLnSpc="1">
+            <a:prstTxWarp prst="textNoShape">
+              <a:avLst/>
+            </a:prstTxWarp>
+            <a:noAutofit/>
+          </a:bodyPr>
+          <a:lstStyle/>
+          <a:p>
+            <a:pPr lvl="0" algn="ctr"/>
+            <a:r>
+              <a:rPr lang="en-US" sz="1200" b="1" dirty="0" smtClean="0">
+                <a:solidFill>
+                  <a:srgbClr val="FFFFFF"/>
+                </a:solidFill>
+                <a:latin typeface="Arial" panose="020B0604020202020204" pitchFamily="34" charset="0"/>
+                <a:cs typeface="Arial" pitchFamily="34" charset="0"/>
+              </a:rPr>
+              <a:t>2.1</a:t>
+            </a:r>
+            <a:endParaRPr lang="en-US" sz="1200" b="1" dirty="0">
+              <a:solidFill>
+                <a:srgbClr val="FFFFFF"/>
+              </a:solidFill>
+              <a:latin typeface="Arial" panose="020B0604020202020204" pitchFamily="34" charset="0"/>
+              <a:cs typeface="Arial" pitchFamily="34" charset="0"/>
+            </a:endParaRPr>
+          </a:p>
+        </p:txBody>
+      </p:sp>
+      <p:sp>
+        <p:nvSpPr>
+          <p:cNvPr id="49" name="NumberBall"/>
+          <p:cNvSpPr>
+            <a:spLocks noChangeArrowheads="1"/>
+          </p:cNvSpPr>
+          <p:nvPr/>
+        </p:nvSpPr>
+        <p:spPr bwMode="gray">
+          <a:xfrm>
+            <a:off x="2766495" y="6014203"/>
+            <a:ext cx="295275" cy="295275"/>
+          </a:xfrm>
+          <a:prstGeom prst="ellipse">
+            <a:avLst/>
+          </a:prstGeom>
+          <a:solidFill>
+            <a:srgbClr val="4472C4"/>
+          </a:solidFill>
+          <a:ln w="9525">
+            <a:solidFill>
+              <a:schemeClr val="bg1"/>
+            </a:solidFill>
+          </a:ln>
+        </p:spPr>
+        <p:style>
+          <a:lnRef idx="2">
+            <a:schemeClr val="accent1">
+              <a:shade val="50000"/>
+            </a:schemeClr>
+          </a:lnRef>
+          <a:fillRef idx="1">
+            <a:schemeClr val="accent1"/>
+          </a:fillRef>
+          <a:effectRef idx="0">
+            <a:schemeClr val="accent1"/>
+          </a:effectRef>
+          <a:fontRef idx="minor">
+            <a:schemeClr val="lt1"/>
+          </a:fontRef>
+        </p:style>
+        <p:txBody>
+          <a:bodyPr rot="0" spcFirstLastPara="0" vertOverflow="overflow" horzOverflow="overflow" vert="horz" wrap="none" lIns="0" tIns="0" rIns="0" bIns="0" numCol="1" spcCol="0" rtlCol="0" fromWordArt="0" anchor="ctr" anchorCtr="0" forceAA="0" compatLnSpc="1">
+            <a:prstTxWarp prst="textNoShape">
+              <a:avLst/>
+            </a:prstTxWarp>
+            <a:noAutofit/>
+          </a:bodyPr>
+          <a:lstStyle/>
+          <a:p>
+            <a:pPr lvl="0" algn="ctr"/>
+            <a:r>
+              <a:rPr lang="en-US" sz="1200" b="1" dirty="0" smtClean="0">
+                <a:solidFill>
+                  <a:srgbClr val="FFFFFF"/>
+                </a:solidFill>
+                <a:latin typeface="Arial" panose="020B0604020202020204" pitchFamily="34" charset="0"/>
+                <a:cs typeface="Arial" pitchFamily="34" charset="0"/>
+              </a:rPr>
+              <a:t>3.1</a:t>
+            </a:r>
+            <a:endParaRPr lang="en-US" sz="1200" b="1" dirty="0">
+              <a:solidFill>
+                <a:srgbClr val="FFFFFF"/>
+              </a:solidFill>
+              <a:latin typeface="Arial" panose="020B0604020202020204" pitchFamily="34" charset="0"/>
+              <a:cs typeface="Arial" pitchFamily="34" charset="0"/>
+            </a:endParaRPr>
+          </a:p>
+        </p:txBody>
+      </p:sp>
+      <p:sp>
+        <p:nvSpPr>
+          <p:cNvPr id="50" name="NumberBall"/>
+          <p:cNvSpPr>
+            <a:spLocks noChangeArrowheads="1"/>
+          </p:cNvSpPr>
+          <p:nvPr/>
+        </p:nvSpPr>
+        <p:spPr bwMode="gray">
+          <a:xfrm>
+            <a:off x="3127206" y="2740296"/>
+            <a:ext cx="295275" cy="295275"/>
+          </a:xfrm>
+          <a:prstGeom prst="ellipse">
+            <a:avLst/>
+          </a:prstGeom>
+          <a:solidFill>
+            <a:srgbClr val="4472C4"/>
+          </a:solidFill>
+          <a:ln w="9525">
+            <a:solidFill>
+              <a:schemeClr val="bg1"/>
+            </a:solidFill>
+          </a:ln>
+        </p:spPr>
+        <p:style>
+          <a:lnRef idx="2">
+            <a:schemeClr val="accent1">
+              <a:shade val="50000"/>
+            </a:schemeClr>
+          </a:lnRef>
+          <a:fillRef idx="1">
+            <a:schemeClr val="accent1"/>
+          </a:fillRef>
+          <a:effectRef idx="0">
+            <a:schemeClr val="accent1"/>
+          </a:effectRef>
+          <a:fontRef idx="minor">
+            <a:schemeClr val="lt1"/>
+          </a:fontRef>
+        </p:style>
+        <p:txBody>
+          <a:bodyPr rot="0" spcFirstLastPara="0" vertOverflow="overflow" horzOverflow="overflow" vert="horz" wrap="none" lIns="0" tIns="0" rIns="0" bIns="0" numCol="1" spcCol="0" rtlCol="0" fromWordArt="0" anchor="ctr" anchorCtr="0" forceAA="0" compatLnSpc="1">
+            <a:prstTxWarp prst="textNoShape">
+              <a:avLst/>
+            </a:prstTxWarp>
+            <a:noAutofit/>
+          </a:bodyPr>
+          <a:lstStyle/>
+          <a:p>
+            <a:pPr lvl="0" algn="ctr"/>
+            <a:r>
+              <a:rPr lang="en-US" sz="1200" b="1" dirty="0" smtClean="0">
+                <a:solidFill>
+                  <a:srgbClr val="FFFFFF"/>
+                </a:solidFill>
+                <a:latin typeface="Arial" panose="020B0604020202020204" pitchFamily="34" charset="0"/>
+                <a:cs typeface="Arial" pitchFamily="34" charset="0"/>
+              </a:rPr>
+              <a:t>1.2</a:t>
+            </a:r>
+            <a:endParaRPr lang="en-US" sz="1200" b="1" dirty="0">
+              <a:solidFill>
+                <a:srgbClr val="FFFFFF"/>
+              </a:solidFill>
+              <a:latin typeface="Arial" panose="020B0604020202020204" pitchFamily="34" charset="0"/>
+              <a:cs typeface="Arial" pitchFamily="34" charset="0"/>
+            </a:endParaRPr>
+          </a:p>
+        </p:txBody>
+      </p:sp>
+      <p:sp>
+        <p:nvSpPr>
+          <p:cNvPr id="51" name="NumberBall"/>
+          <p:cNvSpPr>
+            <a:spLocks noChangeArrowheads="1"/>
+          </p:cNvSpPr>
+          <p:nvPr/>
+        </p:nvSpPr>
+        <p:spPr bwMode="gray">
+          <a:xfrm>
+            <a:off x="6687625" y="3066808"/>
+            <a:ext cx="295275" cy="295275"/>
+          </a:xfrm>
+          <a:prstGeom prst="ellipse">
+            <a:avLst/>
+          </a:prstGeom>
+          <a:solidFill>
+            <a:srgbClr val="4472C4"/>
+          </a:solidFill>
+          <a:ln w="9525">
+            <a:solidFill>
+              <a:schemeClr val="bg1"/>
+            </a:solidFill>
+          </a:ln>
+        </p:spPr>
+        <p:style>
+          <a:lnRef idx="2">
+            <a:schemeClr val="accent1">
+              <a:shade val="50000"/>
+            </a:schemeClr>
+          </a:lnRef>
+          <a:fillRef idx="1">
+            <a:schemeClr val="accent1"/>
+          </a:fillRef>
+          <a:effectRef idx="0">
+            <a:schemeClr val="accent1"/>
+          </a:effectRef>
+          <a:fontRef idx="minor">
+            <a:schemeClr val="lt1"/>
+          </a:fontRef>
+        </p:style>
+        <p:txBody>
+          <a:bodyPr rot="0" spcFirstLastPara="0" vertOverflow="overflow" horzOverflow="overflow" vert="horz" wrap="none" lIns="0" tIns="0" rIns="0" bIns="0" numCol="1" spcCol="0" rtlCol="0" fromWordArt="0" anchor="ctr" anchorCtr="0" forceAA="0" compatLnSpc="1">
+            <a:prstTxWarp prst="textNoShape">
+              <a:avLst/>
+            </a:prstTxWarp>
+            <a:noAutofit/>
+          </a:bodyPr>
+          <a:lstStyle/>
+          <a:p>
+            <a:pPr lvl="0" algn="ctr"/>
+            <a:r>
+              <a:rPr lang="en-US" sz="1200" b="1" dirty="0" smtClean="0">
+                <a:solidFill>
+                  <a:srgbClr val="FFFFFF"/>
+                </a:solidFill>
+                <a:latin typeface="Arial" panose="020B0604020202020204" pitchFamily="34" charset="0"/>
+                <a:cs typeface="Arial" pitchFamily="34" charset="0"/>
+              </a:rPr>
+              <a:t>2.2</a:t>
+            </a:r>
+            <a:endParaRPr lang="en-US" sz="1200" b="1" dirty="0">
+              <a:solidFill>
+                <a:srgbClr val="FFFFFF"/>
+              </a:solidFill>
+              <a:latin typeface="Arial" panose="020B0604020202020204" pitchFamily="34" charset="0"/>
+              <a:cs typeface="Arial" pitchFamily="34" charset="0"/>
+            </a:endParaRPr>
+          </a:p>
+        </p:txBody>
+      </p:sp>
+      <p:sp>
+        <p:nvSpPr>
+          <p:cNvPr id="52" name="NumberBall"/>
+          <p:cNvSpPr>
+            <a:spLocks noChangeArrowheads="1"/>
+          </p:cNvSpPr>
+          <p:nvPr/>
+        </p:nvSpPr>
+        <p:spPr bwMode="gray">
+          <a:xfrm>
+            <a:off x="3613319" y="6161839"/>
+            <a:ext cx="295275" cy="295275"/>
+          </a:xfrm>
+          <a:prstGeom prst="ellipse">
+            <a:avLst/>
+          </a:prstGeom>
+          <a:solidFill>
+            <a:srgbClr val="4472C4"/>
+          </a:solidFill>
+          <a:ln w="9525">
+            <a:solidFill>
+              <a:schemeClr val="bg1"/>
+            </a:solidFill>
+          </a:ln>
+        </p:spPr>
+        <p:style>
+          <a:lnRef idx="2">
+            <a:schemeClr val="accent1">
+              <a:shade val="50000"/>
+            </a:schemeClr>
+          </a:lnRef>
+          <a:fillRef idx="1">
+            <a:schemeClr val="accent1"/>
+          </a:fillRef>
+          <a:effectRef idx="0">
+            <a:schemeClr val="accent1"/>
+          </a:effectRef>
+          <a:fontRef idx="minor">
+            <a:schemeClr val="lt1"/>
+          </a:fontRef>
+        </p:style>
+        <p:txBody>
+          <a:bodyPr rot="0" spcFirstLastPara="0" vertOverflow="overflow" horzOverflow="overflow" vert="horz" wrap="none" lIns="0" tIns="0" rIns="0" bIns="0" numCol="1" spcCol="0" rtlCol="0" fromWordArt="0" anchor="ctr" anchorCtr="0" forceAA="0" compatLnSpc="1">
+            <a:prstTxWarp prst="textNoShape">
+              <a:avLst/>
+            </a:prstTxWarp>
+            <a:noAutofit/>
+          </a:bodyPr>
+          <a:lstStyle/>
+          <a:p>
+            <a:pPr lvl="0" algn="ctr"/>
+            <a:r>
+              <a:rPr lang="en-US" sz="1200" b="1" dirty="0" smtClean="0">
+                <a:solidFill>
+                  <a:srgbClr val="FFFFFF"/>
+                </a:solidFill>
+                <a:latin typeface="Arial" panose="020B0604020202020204" pitchFamily="34" charset="0"/>
+                <a:cs typeface="Arial" pitchFamily="34" charset="0"/>
+              </a:rPr>
+              <a:t>3.2</a:t>
+            </a:r>
+            <a:endParaRPr lang="en-US" sz="1200" b="1" dirty="0">
+              <a:solidFill>
+                <a:srgbClr val="FFFFFF"/>
+              </a:solidFill>
+              <a:latin typeface="Arial" panose="020B0604020202020204" pitchFamily="34" charset="0"/>
+              <a:cs typeface="Arial" pitchFamily="34" charset="0"/>
+            </a:endParaRPr>
+          </a:p>
+        </p:txBody>
+      </p:sp>
+      <p:sp>
+        <p:nvSpPr>
+          <p:cNvPr id="53" name="NumberBall"/>
+          <p:cNvSpPr>
+            <a:spLocks noChangeArrowheads="1"/>
+          </p:cNvSpPr>
+          <p:nvPr/>
+        </p:nvSpPr>
+        <p:spPr bwMode="gray">
+          <a:xfrm>
+            <a:off x="4770042" y="3301999"/>
+            <a:ext cx="295275" cy="295275"/>
+          </a:xfrm>
+          <a:prstGeom prst="ellipse">
+            <a:avLst/>
+          </a:prstGeom>
+          <a:solidFill>
+            <a:srgbClr val="4472C4"/>
+          </a:solidFill>
+          <a:ln w="9525">
+            <a:solidFill>
+              <a:schemeClr val="bg1"/>
+            </a:solidFill>
+          </a:ln>
+        </p:spPr>
+        <p:style>
+          <a:lnRef idx="2">
+            <a:schemeClr val="accent1">
+              <a:shade val="50000"/>
+            </a:schemeClr>
+          </a:lnRef>
+          <a:fillRef idx="1">
+            <a:schemeClr val="accent1"/>
+          </a:fillRef>
+          <a:effectRef idx="0">
+            <a:schemeClr val="accent1"/>
+          </a:effectRef>
+          <a:fontRef idx="minor">
+            <a:schemeClr val="lt1"/>
+          </a:fontRef>
+        </p:style>
+        <p:txBody>
+          <a:bodyPr rot="0" spcFirstLastPara="0" vertOverflow="overflow" horzOverflow="overflow" vert="horz" wrap="none" lIns="0" tIns="0" rIns="0" bIns="0" numCol="1" spcCol="0" rtlCol="0" fromWordArt="0" anchor="ctr" anchorCtr="0" forceAA="0" compatLnSpc="1">
+            <a:prstTxWarp prst="textNoShape">
+              <a:avLst/>
+            </a:prstTxWarp>
+            <a:noAutofit/>
+          </a:bodyPr>
+          <a:lstStyle/>
+          <a:p>
+            <a:pPr lvl="0" algn="ctr"/>
+            <a:r>
+              <a:rPr lang="en-US" sz="1200" b="1" dirty="0" smtClean="0">
+                <a:solidFill>
+                  <a:srgbClr val="FFFFFF"/>
+                </a:solidFill>
+                <a:latin typeface="Arial" panose="020B0604020202020204" pitchFamily="34" charset="0"/>
+                <a:cs typeface="Arial" pitchFamily="34" charset="0"/>
+              </a:rPr>
+              <a:t>1.3</a:t>
+            </a:r>
+            <a:endParaRPr lang="en-US" sz="1200" b="1" dirty="0">
+              <a:solidFill>
+                <a:srgbClr val="FFFFFF"/>
+              </a:solidFill>
+              <a:latin typeface="Arial" panose="020B0604020202020204" pitchFamily="34" charset="0"/>
+              <a:cs typeface="Arial" pitchFamily="34" charset="0"/>
+            </a:endParaRPr>
+          </a:p>
+        </p:txBody>
+      </p:sp>
+      <p:sp>
+        <p:nvSpPr>
+          <p:cNvPr id="54" name="NumberBall"/>
+          <p:cNvSpPr>
+            <a:spLocks noChangeArrowheads="1"/>
+          </p:cNvSpPr>
+          <p:nvPr/>
+        </p:nvSpPr>
+        <p:spPr bwMode="gray">
+          <a:xfrm>
+            <a:off x="2362583" y="4000841"/>
+            <a:ext cx="295275" cy="295275"/>
+          </a:xfrm>
+          <a:prstGeom prst="ellipse">
+            <a:avLst/>
+          </a:prstGeom>
+          <a:solidFill>
+            <a:srgbClr val="4472C4"/>
+          </a:solidFill>
+          <a:ln w="9525">
+            <a:solidFill>
+              <a:schemeClr val="bg1"/>
+            </a:solidFill>
+          </a:ln>
+        </p:spPr>
+        <p:style>
+          <a:lnRef idx="2">
+            <a:schemeClr val="accent1">
+              <a:shade val="50000"/>
+            </a:schemeClr>
+          </a:lnRef>
+          <a:fillRef idx="1">
+            <a:schemeClr val="accent1"/>
+          </a:fillRef>
+          <a:effectRef idx="0">
+            <a:schemeClr val="accent1"/>
+          </a:effectRef>
+          <a:fontRef idx="minor">
+            <a:schemeClr val="lt1"/>
+          </a:fontRef>
+        </p:style>
+        <p:txBody>
+          <a:bodyPr rot="0" spcFirstLastPara="0" vertOverflow="overflow" horzOverflow="overflow" vert="horz" wrap="none" lIns="0" tIns="0" rIns="0" bIns="0" numCol="1" spcCol="0" rtlCol="0" fromWordArt="0" anchor="ctr" anchorCtr="0" forceAA="0" compatLnSpc="1">
+            <a:prstTxWarp prst="textNoShape">
+              <a:avLst/>
+            </a:prstTxWarp>
+            <a:noAutofit/>
+          </a:bodyPr>
+          <a:lstStyle/>
+          <a:p>
+            <a:pPr lvl="0" algn="ctr"/>
+            <a:r>
+              <a:rPr lang="en-US" sz="1200" b="1" dirty="0" smtClean="0">
+                <a:solidFill>
+                  <a:srgbClr val="FFFFFF"/>
+                </a:solidFill>
+                <a:latin typeface="Arial" panose="020B0604020202020204" pitchFamily="34" charset="0"/>
+                <a:cs typeface="Arial" pitchFamily="34" charset="0"/>
+              </a:rPr>
+              <a:t>1.4</a:t>
+            </a:r>
+            <a:endParaRPr lang="en-US" sz="1200" b="1" dirty="0">
+              <a:solidFill>
+                <a:srgbClr val="FFFFFF"/>
+              </a:solidFill>
+              <a:latin typeface="Arial" panose="020B0604020202020204" pitchFamily="34" charset="0"/>
+              <a:cs typeface="Arial" pitchFamily="34" charset="0"/>
+            </a:endParaRPr>
+          </a:p>
+        </p:txBody>
+      </p:sp>
+      <p:sp>
+        <p:nvSpPr>
+          <p:cNvPr id="55" name="NumberBall"/>
+          <p:cNvSpPr>
+            <a:spLocks noChangeArrowheads="1"/>
+          </p:cNvSpPr>
+          <p:nvPr/>
+        </p:nvSpPr>
+        <p:spPr bwMode="gray">
+          <a:xfrm>
+            <a:off x="3028519" y="3627263"/>
+            <a:ext cx="295275" cy="295275"/>
+          </a:xfrm>
+          <a:prstGeom prst="ellipse">
+            <a:avLst/>
+          </a:prstGeom>
+          <a:solidFill>
+            <a:srgbClr val="4472C4"/>
+          </a:solidFill>
+          <a:ln w="9525">
+            <a:solidFill>
+              <a:schemeClr val="bg1"/>
+            </a:solidFill>
+          </a:ln>
+        </p:spPr>
+        <p:style>
+          <a:lnRef idx="2">
+            <a:schemeClr val="accent1">
+              <a:shade val="50000"/>
+            </a:schemeClr>
+          </a:lnRef>
+          <a:fillRef idx="1">
+            <a:schemeClr val="accent1"/>
+          </a:fillRef>
+          <a:effectRef idx="0">
+            <a:schemeClr val="accent1"/>
+          </a:effectRef>
+          <a:fontRef idx="minor">
+            <a:schemeClr val="lt1"/>
+          </a:fontRef>
+        </p:style>
+        <p:txBody>
+          <a:bodyPr rot="0" spcFirstLastPara="0" vertOverflow="overflow" horzOverflow="overflow" vert="horz" wrap="none" lIns="0" tIns="0" rIns="0" bIns="0" numCol="1" spcCol="0" rtlCol="0" fromWordArt="0" anchor="ctr" anchorCtr="0" forceAA="0" compatLnSpc="1">
+            <a:prstTxWarp prst="textNoShape">
+              <a:avLst/>
+            </a:prstTxWarp>
+            <a:noAutofit/>
+          </a:bodyPr>
+          <a:lstStyle/>
+          <a:p>
+            <a:pPr lvl="0" algn="ctr"/>
+            <a:r>
+              <a:rPr lang="en-US" sz="1200" b="1" dirty="0" smtClean="0">
+                <a:solidFill>
+                  <a:srgbClr val="FFFFFF"/>
+                </a:solidFill>
+                <a:latin typeface="Arial" panose="020B0604020202020204" pitchFamily="34" charset="0"/>
+                <a:cs typeface="Arial" pitchFamily="34" charset="0"/>
+              </a:rPr>
+              <a:t>1.5</a:t>
+            </a:r>
+            <a:endParaRPr lang="en-US" sz="1200" b="1" dirty="0">
+              <a:solidFill>
+                <a:srgbClr val="FFFFFF"/>
+              </a:solidFill>
+              <a:latin typeface="Arial" panose="020B0604020202020204" pitchFamily="34" charset="0"/>
+              <a:cs typeface="Arial" pitchFamily="34" charset="0"/>
+            </a:endParaRPr>
+          </a:p>
+        </p:txBody>
+      </p:sp>
+      <p:sp>
+        <p:nvSpPr>
+          <p:cNvPr id="56" name="NumberBall"/>
+          <p:cNvSpPr>
+            <a:spLocks noChangeArrowheads="1"/>
+          </p:cNvSpPr>
+          <p:nvPr/>
+        </p:nvSpPr>
+        <p:spPr bwMode="gray">
+          <a:xfrm>
+            <a:off x="2618857" y="5142673"/>
+            <a:ext cx="295275" cy="295275"/>
+          </a:xfrm>
+          <a:prstGeom prst="ellipse">
+            <a:avLst/>
+          </a:prstGeom>
+          <a:solidFill>
+            <a:srgbClr val="4472C4"/>
+          </a:solidFill>
+          <a:ln w="9525">
+            <a:solidFill>
+              <a:schemeClr val="bg1"/>
+            </a:solidFill>
+          </a:ln>
+        </p:spPr>
+        <p:style>
+          <a:lnRef idx="2">
+            <a:schemeClr val="accent1">
+              <a:shade val="50000"/>
+            </a:schemeClr>
+          </a:lnRef>
+          <a:fillRef idx="1">
+            <a:schemeClr val="accent1"/>
+          </a:fillRef>
+          <a:effectRef idx="0">
+            <a:schemeClr val="accent1"/>
+          </a:effectRef>
+          <a:fontRef idx="minor">
+            <a:schemeClr val="lt1"/>
+          </a:fontRef>
+        </p:style>
+        <p:txBody>
+          <a:bodyPr rot="0" spcFirstLastPara="0" vertOverflow="overflow" horzOverflow="overflow" vert="horz" wrap="none" lIns="0" tIns="0" rIns="0" bIns="0" numCol="1" spcCol="0" rtlCol="0" fromWordArt="0" anchor="ctr" anchorCtr="0" forceAA="0" compatLnSpc="1">
+            <a:prstTxWarp prst="textNoShape">
+              <a:avLst/>
+            </a:prstTxWarp>
+            <a:noAutofit/>
+          </a:bodyPr>
+          <a:lstStyle/>
+          <a:p>
+            <a:pPr lvl="0" algn="ctr"/>
+            <a:r>
+              <a:rPr lang="en-US" sz="1200" b="1" dirty="0" smtClean="0">
+                <a:solidFill>
+                  <a:srgbClr val="FFFFFF"/>
+                </a:solidFill>
+                <a:latin typeface="Arial" panose="020B0604020202020204" pitchFamily="34" charset="0"/>
+                <a:cs typeface="Arial" pitchFamily="34" charset="0"/>
+              </a:rPr>
+              <a:t>1.6</a:t>
+            </a:r>
+            <a:endParaRPr lang="en-US" sz="1200" b="1" dirty="0">
+              <a:solidFill>
+                <a:srgbClr val="FFFFFF"/>
+              </a:solidFill>
+              <a:latin typeface="Arial" panose="020B0604020202020204" pitchFamily="34" charset="0"/>
+              <a:cs typeface="Arial" pitchFamily="34" charset="0"/>
+            </a:endParaRPr>
+          </a:p>
+        </p:txBody>
+      </p:sp>
+      <p:sp>
+        <p:nvSpPr>
+          <p:cNvPr id="57" name="NumberBall"/>
+          <p:cNvSpPr>
+            <a:spLocks noChangeArrowheads="1"/>
+          </p:cNvSpPr>
+          <p:nvPr/>
+        </p:nvSpPr>
+        <p:spPr bwMode="gray">
+          <a:xfrm>
+            <a:off x="4829362" y="4912771"/>
+            <a:ext cx="295275" cy="295275"/>
+          </a:xfrm>
+          <a:prstGeom prst="ellipse">
+            <a:avLst/>
+          </a:prstGeom>
+          <a:solidFill>
+            <a:srgbClr val="4472C4"/>
+          </a:solidFill>
+          <a:ln w="9525">
+            <a:solidFill>
+              <a:schemeClr val="bg1"/>
+            </a:solidFill>
+          </a:ln>
+        </p:spPr>
+        <p:style>
+          <a:lnRef idx="2">
+            <a:schemeClr val="accent1">
+              <a:shade val="50000"/>
+            </a:schemeClr>
+          </a:lnRef>
+          <a:fillRef idx="1">
+            <a:schemeClr val="accent1"/>
+          </a:fillRef>
+          <a:effectRef idx="0">
+            <a:schemeClr val="accent1"/>
+          </a:effectRef>
+          <a:fontRef idx="minor">
+            <a:schemeClr val="lt1"/>
+          </a:fontRef>
+        </p:style>
+        <p:txBody>
+          <a:bodyPr rot="0" spcFirstLastPara="0" vertOverflow="overflow" horzOverflow="overflow" vert="horz" wrap="none" lIns="0" tIns="0" rIns="0" bIns="0" numCol="1" spcCol="0" rtlCol="0" fromWordArt="0" anchor="ctr" anchorCtr="0" forceAA="0" compatLnSpc="1">
+            <a:prstTxWarp prst="textNoShape">
+              <a:avLst/>
+            </a:prstTxWarp>
+            <a:noAutofit/>
+          </a:bodyPr>
+          <a:lstStyle/>
+          <a:p>
+            <a:pPr lvl="0" algn="ctr"/>
+            <a:r>
+              <a:rPr lang="en-US" sz="1200" b="1" dirty="0" smtClean="0">
+                <a:solidFill>
+                  <a:srgbClr val="FFFFFF"/>
+                </a:solidFill>
+                <a:latin typeface="Arial" panose="020B0604020202020204" pitchFamily="34" charset="0"/>
+                <a:cs typeface="Arial" pitchFamily="34" charset="0"/>
+              </a:rPr>
+              <a:t>1.7</a:t>
+            </a:r>
+            <a:endParaRPr lang="en-US" sz="1200" b="1" dirty="0">
+              <a:solidFill>
+                <a:srgbClr val="FFFFFF"/>
+              </a:solidFill>
+              <a:latin typeface="Arial" panose="020B0604020202020204" pitchFamily="34" charset="0"/>
+              <a:cs typeface="Arial" pitchFamily="34" charset="0"/>
+            </a:endParaRPr>
+          </a:p>
+        </p:txBody>
+      </p:sp>
+      <p:sp>
+        <p:nvSpPr>
+          <p:cNvPr id="64" name="Rectangle 4"/>
+          <p:cNvSpPr>
+            <a:spLocks noChangeArrowheads="1"/>
+          </p:cNvSpPr>
+          <p:nvPr/>
+        </p:nvSpPr>
+        <p:spPr bwMode="gray">
+          <a:xfrm>
+            <a:off x="6418190" y="4296116"/>
+            <a:ext cx="1994931" cy="400110"/>
+          </a:xfrm>
+          <a:prstGeom prst="rect">
+            <a:avLst/>
+          </a:prstGeom>
+          <a:solidFill>
+            <a:schemeClr val="bg1"/>
+          </a:solidFill>
+          <a:ln w="9525" algn="ctr">
+            <a:noFill/>
+            <a:miter lim="800000"/>
+            <a:headEnd type="none" w="lg" len="lg"/>
+            <a:tailEnd type="none" w="lg" len="lg"/>
+          </a:ln>
+          <a:effectLst>
+            <a:outerShdw dist="25400" dir="5400000" sx="99000" sy="99000" algn="ctr" rotWithShape="0">
+              <a:schemeClr val="accent5"/>
+            </a:outerShdw>
+          </a:effectLst>
+        </p:spPr>
+        <p:txBody>
+          <a:bodyPr wrap="square" tIns="91440" bIns="91440" anchor="b">
+            <a:spAutoFit/>
+          </a:bodyPr>
+          <a:lstStyle/>
+          <a:p>
+            <a:pPr algn="ctr"/>
+            <a:r>
+              <a:rPr lang="en-US" sz="1400" b="1" dirty="0" smtClean="0">
+                <a:solidFill>
+                  <a:srgbClr val="000000"/>
+                </a:solidFill>
+                <a:latin typeface="Arial" pitchFamily="34" charset="0"/>
+                <a:cs typeface="Arial" pitchFamily="34" charset="0"/>
+              </a:rPr>
+              <a:t>Legend</a:t>
+            </a:r>
+            <a:endParaRPr lang="en-US" sz="1400" b="1" dirty="0">
+              <a:solidFill>
+                <a:srgbClr val="000000"/>
+              </a:solidFill>
+              <a:latin typeface="Arial" pitchFamily="34" charset="0"/>
+              <a:cs typeface="Arial" pitchFamily="34" charset="0"/>
+            </a:endParaRPr>
+          </a:p>
+        </p:txBody>
+      </p:sp>
+      <p:pic>
+        <p:nvPicPr>
+          <p:cNvPr id="11" name="Picture 10"/>
+          <p:cNvPicPr>
+            <a:picLocks noChangeAspect="1"/>
+          </p:cNvPicPr>
+          <p:nvPr/>
+        </p:nvPicPr>
+        <p:blipFill>
+          <a:blip r:embed="rId8"/>
+          <a:stretch>
+            <a:fillRect/>
+          </a:stretch>
+        </p:blipFill>
+        <p:spPr>
+          <a:xfrm>
+            <a:off x="6419372" y="4848103"/>
+            <a:ext cx="415890" cy="369068"/>
+          </a:xfrm>
+          <a:prstGeom prst="rect">
+            <a:avLst/>
+          </a:prstGeom>
+        </p:spPr>
+      </p:pic>
+      <p:pic>
+        <p:nvPicPr>
+          <p:cNvPr id="66" name="Picture 65"/>
+          <p:cNvPicPr>
+            <a:picLocks noChangeAspect="1"/>
+          </p:cNvPicPr>
+          <p:nvPr/>
+        </p:nvPicPr>
+        <p:blipFill>
+          <a:blip r:embed="rId9">
+            <a:duotone>
+              <a:prstClr val="black"/>
+              <a:schemeClr val="accent2">
+                <a:tint val="45000"/>
+                <a:satMod val="400000"/>
+              </a:schemeClr>
+            </a:duotone>
+          </a:blip>
+          <a:stretch>
+            <a:fillRect/>
+          </a:stretch>
+        </p:blipFill>
+        <p:spPr>
+          <a:xfrm>
+            <a:off x="6419372" y="5352366"/>
+            <a:ext cx="415890" cy="369068"/>
+          </a:xfrm>
+          <a:prstGeom prst="rect">
+            <a:avLst/>
+          </a:prstGeom>
+        </p:spPr>
+      </p:pic>
+      <p:sp>
+        <p:nvSpPr>
+          <p:cNvPr id="67" name="Rectangle 66"/>
+          <p:cNvSpPr/>
+          <p:nvPr/>
+        </p:nvSpPr>
+        <p:spPr>
+          <a:xfrm>
+            <a:off x="6920629" y="4770265"/>
+            <a:ext cx="1492492" cy="549042"/>
+          </a:xfrm>
+          <a:prstGeom prst="rect">
             <a:avLst/>
           </a:prstGeom>
           <a:noFill/>
-          <a:ln w="6350" cap="flat" cmpd="sng" algn="ctr">
-            <a:solidFill>
-              <a:srgbClr val="4D4D4D"/>
-            </a:solidFill>
-            <a:prstDash val="solid"/>
-            <a:miter lim="800000"/>
+          <a:ln>
+            <a:noFill/>
           </a:ln>
-          <a:effectLst/>
           <a:extLst>
             <a:ext uri="{909E8E84-426E-40DD-AFC4-6F175D3DCCD1}">
               <a14:hiddenFill xmlns:a14="http://schemas.microsoft.com/office/drawing/2010/main">
                 <a:solidFill>
-                  <a:schemeClr val="accent1"/>
+                  <a:srgbClr val="E2E2E2"/>
                 </a:solidFill>
               </a14:hiddenFill>
             </a:ext>
@@ -19004,11 +21359,221 @@
             <a:schemeClr val="lt1"/>
           </a:fontRef>
         </p:style>
+        <p:txBody>
+          <a:bodyPr rtlCol="0" anchor="ctr"/>
+          <a:lstStyle/>
+          <a:p>
+            <a:r>
+              <a:rPr lang="en-US" sz="1600" dirty="0" smtClean="0">
+                <a:solidFill>
+                  <a:schemeClr val="tx1"/>
+                </a:solidFill>
+                <a:latin typeface="Arial" panose="020B0604020202020204" pitchFamily="34" charset="0"/>
+                <a:cs typeface="Arial" panose="020B0604020202020204" pitchFamily="34" charset="0"/>
+              </a:rPr>
+              <a:t>Header file</a:t>
+            </a:r>
+            <a:endParaRPr lang="en-US" sz="1600" dirty="0">
+              <a:solidFill>
+                <a:schemeClr val="tx1"/>
+              </a:solidFill>
+              <a:latin typeface="Arial" panose="020B0604020202020204" pitchFamily="34" charset="0"/>
+              <a:cs typeface="Arial" panose="020B0604020202020204" pitchFamily="34" charset="0"/>
+            </a:endParaRPr>
+          </a:p>
+        </p:txBody>
+      </p:sp>
+      <p:sp>
+        <p:nvSpPr>
+          <p:cNvPr id="68" name="Rectangle 67"/>
+          <p:cNvSpPr/>
+          <p:nvPr/>
+        </p:nvSpPr>
+        <p:spPr>
+          <a:xfrm>
+            <a:off x="6920629" y="5260910"/>
+            <a:ext cx="1492492" cy="549042"/>
+          </a:xfrm>
+          <a:prstGeom prst="rect">
+            <a:avLst/>
+          </a:prstGeom>
+          <a:noFill/>
+          <a:ln>
+            <a:noFill/>
+          </a:ln>
+          <a:extLst>
+            <a:ext uri="{909E8E84-426E-40DD-AFC4-6F175D3DCCD1}">
+              <a14:hiddenFill xmlns:a14="http://schemas.microsoft.com/office/drawing/2010/main">
+                <a:solidFill>
+                  <a:srgbClr val="E2E2E2"/>
+                </a:solidFill>
+              </a14:hiddenFill>
+            </a:ext>
+          </a:extLst>
+        </p:spPr>
+        <p:style>
+          <a:lnRef idx="2">
+            <a:schemeClr val="accent1">
+              <a:shade val="50000"/>
+            </a:schemeClr>
+          </a:lnRef>
+          <a:fillRef idx="1">
+            <a:schemeClr val="accent1"/>
+          </a:fillRef>
+          <a:effectRef idx="0">
+            <a:schemeClr val="accent1"/>
+          </a:effectRef>
+          <a:fontRef idx="minor">
+            <a:schemeClr val="lt1"/>
+          </a:fontRef>
+        </p:style>
+        <p:txBody>
+          <a:bodyPr rtlCol="0" anchor="ctr"/>
+          <a:lstStyle/>
+          <a:p>
+            <a:r>
+              <a:rPr lang="en-US" sz="1600" dirty="0" smtClean="0">
+                <a:solidFill>
+                  <a:schemeClr val="tx1"/>
+                </a:solidFill>
+                <a:latin typeface="Arial" panose="020B0604020202020204" pitchFamily="34" charset="0"/>
+                <a:cs typeface="Arial" panose="020B0604020202020204" pitchFamily="34" charset="0"/>
+              </a:rPr>
+              <a:t>C file</a:t>
+            </a:r>
+            <a:endParaRPr lang="en-US" sz="1600" dirty="0">
+              <a:solidFill>
+                <a:schemeClr val="tx1"/>
+              </a:solidFill>
+              <a:latin typeface="Arial" panose="020B0604020202020204" pitchFamily="34" charset="0"/>
+              <a:cs typeface="Arial" panose="020B0604020202020204" pitchFamily="34" charset="0"/>
+            </a:endParaRPr>
+          </a:p>
+        </p:txBody>
+      </p:sp>
+      <p:cxnSp>
+        <p:nvCxnSpPr>
+          <p:cNvPr id="13" name="Straight Arrow Connector 12"/>
+          <p:cNvCxnSpPr/>
+          <p:nvPr/>
+        </p:nvCxnSpPr>
+        <p:spPr>
+          <a:xfrm flipV="1">
+            <a:off x="6419372" y="5858737"/>
+            <a:ext cx="404230" cy="220377"/>
+          </a:xfrm>
+          <a:prstGeom prst="straightConnector1">
+            <a:avLst/>
+          </a:prstGeom>
+          <a:noFill/>
+          <a:ln w="6350" cap="flat" cmpd="sng" algn="ctr">
+            <a:solidFill>
+              <a:srgbClr val="808080"/>
+            </a:solidFill>
+            <a:prstDash val="solid"/>
+            <a:miter lim="800000"/>
+            <a:tailEnd type="arrow"/>
+          </a:ln>
+          <a:effectLst/>
+          <a:extLst>
+            <a:ext uri="{909E8E84-426E-40DD-AFC4-6F175D3DCCD1}">
+              <a14:hiddenFill xmlns:a14="http://schemas.microsoft.com/office/drawing/2010/main">
+                <a:solidFill>
+                  <a:schemeClr val="accent1"/>
+                </a:solidFill>
+              </a14:hiddenFill>
+            </a:ext>
+          </a:extLst>
+        </p:spPr>
+        <p:style>
+          <a:lnRef idx="2">
+            <a:schemeClr val="accent1">
+              <a:shade val="50000"/>
+            </a:schemeClr>
+          </a:lnRef>
+          <a:fillRef idx="1">
+            <a:schemeClr val="accent1"/>
+          </a:fillRef>
+          <a:effectRef idx="0">
+            <a:schemeClr val="accent1"/>
+          </a:effectRef>
+          <a:fontRef idx="minor">
+            <a:schemeClr val="lt1"/>
+          </a:fontRef>
+        </p:style>
       </p:cxnSp>
+      <p:sp>
+        <p:nvSpPr>
+          <p:cNvPr id="79" name="Rectangle 78"/>
+          <p:cNvSpPr/>
+          <p:nvPr/>
+        </p:nvSpPr>
+        <p:spPr>
+          <a:xfrm>
+            <a:off x="6920629" y="5692789"/>
+            <a:ext cx="1492492" cy="549042"/>
+          </a:xfrm>
+          <a:prstGeom prst="rect">
+            <a:avLst/>
+          </a:prstGeom>
+          <a:noFill/>
+          <a:ln>
+            <a:noFill/>
+          </a:ln>
+          <a:extLst>
+            <a:ext uri="{909E8E84-426E-40DD-AFC4-6F175D3DCCD1}">
+              <a14:hiddenFill xmlns:a14="http://schemas.microsoft.com/office/drawing/2010/main">
+                <a:solidFill>
+                  <a:srgbClr val="E2E2E2"/>
+                </a:solidFill>
+              </a14:hiddenFill>
+            </a:ext>
+          </a:extLst>
+        </p:spPr>
+        <p:style>
+          <a:lnRef idx="2">
+            <a:schemeClr val="accent1">
+              <a:shade val="50000"/>
+            </a:schemeClr>
+          </a:lnRef>
+          <a:fillRef idx="1">
+            <a:schemeClr val="accent1"/>
+          </a:fillRef>
+          <a:effectRef idx="0">
+            <a:schemeClr val="accent1"/>
+          </a:effectRef>
+          <a:fontRef idx="minor">
+            <a:schemeClr val="lt1"/>
+          </a:fontRef>
+        </p:style>
+        <p:txBody>
+          <a:bodyPr rtlCol="0" anchor="ctr"/>
+          <a:lstStyle/>
+          <a:p>
+            <a:r>
+              <a:rPr lang="en-US" sz="1600" dirty="0" smtClean="0">
+                <a:solidFill>
+                  <a:schemeClr val="tx1"/>
+                </a:solidFill>
+                <a:latin typeface="Arial" panose="020B0604020202020204" pitchFamily="34" charset="0"/>
+                <a:cs typeface="Arial" panose="020B0604020202020204" pitchFamily="34" charset="0"/>
+              </a:rPr>
+              <a:t>Dependency</a:t>
+            </a:r>
+            <a:endParaRPr lang="en-US" sz="1600" dirty="0">
+              <a:solidFill>
+                <a:schemeClr val="tx1"/>
+              </a:solidFill>
+              <a:latin typeface="Arial" panose="020B0604020202020204" pitchFamily="34" charset="0"/>
+              <a:cs typeface="Arial" panose="020B0604020202020204" pitchFamily="34" charset="0"/>
+            </a:endParaRPr>
+          </a:p>
+        </p:txBody>
+      </p:sp>
     </p:spTree>
     <p:extLst>
       <p:ext uri="{BB962C8B-B14F-4D97-AF65-F5344CB8AC3E}">
-        <p14:creationId xmlns:p14="http://schemas.microsoft.com/office/powerpoint/2010/main" val="855132440"/>
+        <p14:creationId xmlns:p14="http://schemas.microsoft.com/office/powerpoint/2010/main" val="2926863658"/>
       </p:ext>
     </p:extLst>
   </p:cSld>
@@ -19167,6 +21732,18 @@
 <file path=ppt/tags/tag12.xml><?xml version="1.0" encoding="utf-8"?>
 <p:tagLst xmlns:a="http://schemas.openxmlformats.org/drawingml/2006/main" xmlns:r="http://schemas.openxmlformats.org/officeDocument/2006/relationships" xmlns:p="http://schemas.openxmlformats.org/presentationml/2006/main">
   <p:tag name="THINKCELLSHAPEDONOTDELETE" val="thinkcellActiveDocDoNotDelete"/>
+</p:tagLst>
+</file>
+
+<file path=ppt/tags/tag120.xml><?xml version="1.0" encoding="utf-8"?>
+<p:tagLst xmlns:a="http://schemas.openxmlformats.org/drawingml/2006/main" xmlns:r="http://schemas.openxmlformats.org/officeDocument/2006/relationships" xmlns:p="http://schemas.openxmlformats.org/presentationml/2006/main">
+  <p:tag name="THINKCELLSHAPEDONOTDELETE" val="thinkcellActiveDocDoNotDelete"/>
+</p:tagLst>
+</file>
+
+<file path=ppt/tags/tag121.xml><?xml version="1.0" encoding="utf-8"?>
+<p:tagLst xmlns:a="http://schemas.openxmlformats.org/drawingml/2006/main" xmlns:r="http://schemas.openxmlformats.org/officeDocument/2006/relationships" xmlns:p="http://schemas.openxmlformats.org/presentationml/2006/main">
+  <p:tag name="THINKCELLSHAPEDONOTDELETE" val="txcjg8tT1TdatWqWBGWSnlg"/>
 </p:tagLst>
 </file>
 
@@ -19935,7 +22512,7 @@
   <a:extraClrSchemeLst/>
   <a:extLst>
     <a:ext uri="{05A4C25C-085E-4340-85A3-A5531E510DB2}">
-      <thm15:themeFamily xmlns:thm15="http://schemas.microsoft.com/office/thememl/2012/main" xmlns="" name="PowerPoint CZ.potx" id="{1BD4F44E-F71F-4A14-9EF9-FF6613634235}" vid="{496B007D-76DB-4922-86C8-13F7F6C54EC7}"/>
+      <thm15:themeFamily xmlns:thm15="http://schemas.microsoft.com/office/thememl/2012/main" name="PowerPoint CZ.potx" id="{1BD4F44E-F71F-4A14-9EF9-FF6613634235}" vid="{496B007D-76DB-4922-86C8-13F7F6C54EC7}"/>
     </a:ext>
   </a:extLst>
 </a:theme>

</xml_diff>